<commit_message>
Use simple 4-stages  product lifecyle (explore, growth, sustain, decline) and remove some Lean Startup references
</commit_message>
<xml_diff>
--- a/Assets/1.Landmarks Posters/Continuous Architecture Generic - From Idea to Retirement - 2020.2.pptx
+++ b/Assets/1.Landmarks Posters/Continuous Architecture Generic - From Idea to Retirement - 2020.2.pptx
@@ -271,7 +271,7 @@
           <a:p>
             <a:fld id="{9BFAC1C7-9E5D-4441-A8DE-D4FA72AEF22D}" type="datetimeFigureOut">
               <a:rPr lang="fr-FR" smtClean="0"/>
-              <a:t>20/10/2020</a:t>
+              <a:t>25/11/2020</a:t>
             </a:fld>
             <a:endParaRPr lang="fr-FR"/>
           </a:p>
@@ -437,7 +437,7 @@
           <a:p>
             <a:fld id="{6D15EC3C-BFA7-9E4C-BB13-BAA5658834CA}" type="datetimeFigureOut">
               <a:rPr lang="fr-FR" smtClean="0"/>
-              <a:t>20/10/2020</a:t>
+              <a:t>25/11/2020</a:t>
             </a:fld>
             <a:endParaRPr lang="fr-FR"/>
           </a:p>
@@ -2896,7 +2896,7 @@
           <a:graphicData uri="http://schemas.openxmlformats.org/presentationml/2006/ole">
             <mc:AlternateContent xmlns:mc="http://schemas.openxmlformats.org/markup-compatibility/2006">
               <mc:Choice xmlns:v="urn:schemas-microsoft-com:vml" Requires="v">
-                <p:oleObj spid="_x0000_s3075" name="Diapositive think-cell" r:id="rId4" imgW="270" imgH="270" progId="TCLayout.ActiveDocument.1">
+                <p:oleObj spid="_x0000_s3081" name="Diapositive think-cell" r:id="rId4" imgW="270" imgH="270" progId="TCLayout.ActiveDocument.1">
                   <p:embed/>
                 </p:oleObj>
               </mc:Choice>
@@ -5037,7 +5037,7 @@
               <a:pPr>
                 <a:defRPr/>
               </a:pPr>
-              <a:t>20/10/2020</a:t>
+              <a:t>25/11/2020</a:t>
             </a:fld>
             <a:endParaRPr lang="fr-FR"/>
           </a:p>
@@ -5692,7 +5692,7 @@
           <a:graphicData uri="http://schemas.openxmlformats.org/presentationml/2006/ole">
             <mc:AlternateContent xmlns:mc="http://schemas.openxmlformats.org/markup-compatibility/2006">
               <mc:Choice xmlns:v="urn:schemas-microsoft-com:vml" Requires="v">
-                <p:oleObj spid="_x0000_s5123" name="Diapositive think-cell" r:id="rId4" imgW="270" imgH="270" progId="TCLayout.ActiveDocument.1">
+                <p:oleObj spid="_x0000_s5129" name="Diapositive think-cell" r:id="rId4" imgW="270" imgH="270" progId="TCLayout.ActiveDocument.1">
                   <p:embed/>
                 </p:oleObj>
               </mc:Choice>
@@ -7005,7 +7005,7 @@
           <a:graphicData uri="http://schemas.openxmlformats.org/presentationml/2006/ole">
             <mc:AlternateContent xmlns:mc="http://schemas.openxmlformats.org/markup-compatibility/2006">
               <mc:Choice xmlns:v="urn:schemas-microsoft-com:vml" Requires="v">
-                <p:oleObj spid="_x0000_s7171" name="Diapositive think-cell" r:id="rId4" imgW="270" imgH="270" progId="TCLayout.ActiveDocument.1">
+                <p:oleObj spid="_x0000_s7177" name="Diapositive think-cell" r:id="rId4" imgW="270" imgH="270" progId="TCLayout.ActiveDocument.1">
                   <p:embed/>
                 </p:oleObj>
               </mc:Choice>
@@ -9563,7 +9563,7 @@
           <a:graphicData uri="http://schemas.openxmlformats.org/presentationml/2006/ole">
             <mc:AlternateContent xmlns:mc="http://schemas.openxmlformats.org/markup-compatibility/2006">
               <mc:Choice xmlns:v="urn:schemas-microsoft-com:vml" Requires="v">
-                <p:oleObj spid="_x0000_s9219" name="Diapositive think-cell" r:id="rId4" imgW="270" imgH="270" progId="TCLayout.ActiveDocument.1">
+                <p:oleObj spid="_x0000_s9225" name="Diapositive think-cell" r:id="rId4" imgW="270" imgH="270" progId="TCLayout.ActiveDocument.1">
                   <p:embed/>
                 </p:oleObj>
               </mc:Choice>
@@ -11389,7 +11389,7 @@
           <a:graphicData uri="http://schemas.openxmlformats.org/presentationml/2006/ole">
             <mc:AlternateContent xmlns:mc="http://schemas.openxmlformats.org/markup-compatibility/2006">
               <mc:Choice xmlns:v="urn:schemas-microsoft-com:vml" Requires="v">
-                <p:oleObj spid="_x0000_s11267" name="Diapositive think-cell" r:id="rId4" imgW="270" imgH="270" progId="TCLayout.ActiveDocument.1">
+                <p:oleObj spid="_x0000_s11273" name="Diapositive think-cell" r:id="rId4" imgW="270" imgH="270" progId="TCLayout.ActiveDocument.1">
                   <p:embed/>
                 </p:oleObj>
               </mc:Choice>
@@ -12710,7 +12710,7 @@
               <a:pPr>
                 <a:defRPr/>
               </a:pPr>
-              <a:t>20/10/2020</a:t>
+              <a:t>25/11/2020</a:t>
             </a:fld>
             <a:endParaRPr lang="fr-FR"/>
           </a:p>
@@ -16150,7 +16150,7 @@
             </p:custDataLst>
             <p:extLst>
               <p:ext uri="{D42A27DB-BD31-4B8C-83A1-F6EECF244321}">
-                <p14:modId xmlns:p14="http://schemas.microsoft.com/office/powerpoint/2010/main" val="2454711276"/>
+                <p14:modId xmlns:p14="http://schemas.microsoft.com/office/powerpoint/2010/main" val="3107796253"/>
               </p:ext>
             </p:extLst>
           </p:nvPr>
@@ -16163,7 +16163,7 @@
           <a:graphicData uri="http://schemas.openxmlformats.org/presentationml/2006/ole">
             <mc:AlternateContent xmlns:mc="http://schemas.openxmlformats.org/markup-compatibility/2006">
               <mc:Choice xmlns:v="urn:schemas-microsoft-com:vml" Requires="v">
-                <p:oleObj spid="_x0000_s1027" name="Diapositive think-cell" r:id="rId12" imgW="270" imgH="270" progId="TCLayout.ActiveDocument.1">
+                <p:oleObj spid="_x0000_s1033" name="Diapositive think-cell" r:id="rId12" imgW="270" imgH="270" progId="TCLayout.ActiveDocument.1">
                   <p:embed/>
                 </p:oleObj>
               </mc:Choice>
@@ -16492,6 +16492,72 @@
           <a:chExt cx="0" cy="0"/>
         </a:xfrm>
       </p:grpSpPr>
+      <p:graphicFrame>
+        <p:nvGraphicFramePr>
+          <p:cNvPr id="2" name="Objet 1" hidden="1">
+            <a:extLst>
+              <a:ext uri="{FF2B5EF4-FFF2-40B4-BE49-F238E27FC236}">
+                <a16:creationId xmlns:a16="http://schemas.microsoft.com/office/drawing/2014/main" id="{45B3D423-6E64-754A-9194-0921FE1398BB}"/>
+              </a:ext>
+            </a:extLst>
+          </p:cNvPr>
+          <p:cNvGraphicFramePr>
+            <a:graphicFrameLocks noChangeAspect="1"/>
+          </p:cNvGraphicFramePr>
+          <p:nvPr userDrawn="1">
+            <p:custDataLst>
+              <p:tags r:id="rId10"/>
+            </p:custDataLst>
+            <p:extLst>
+              <p:ext uri="{D42A27DB-BD31-4B8C-83A1-F6EECF244321}">
+                <p14:modId xmlns:p14="http://schemas.microsoft.com/office/powerpoint/2010/main" val="4084108044"/>
+              </p:ext>
+            </p:extLst>
+          </p:nvPr>
+        </p:nvGraphicFramePr>
+        <p:xfrm>
+          <a:off x="1588" y="1588"/>
+          <a:ext cx="1227" cy="1588"/>
+        </p:xfrm>
+        <a:graphic>
+          <a:graphicData uri="http://schemas.openxmlformats.org/presentationml/2006/ole">
+            <mc:AlternateContent xmlns:mc="http://schemas.openxmlformats.org/markup-compatibility/2006">
+              <mc:Choice xmlns:v="urn:schemas-microsoft-com:vml" Requires="v">
+                <p:oleObj spid="_x0000_s16389" name="Diapositive think-cell" r:id="rId11" imgW="7772400" imgH="10058400" progId="TCLayout.ActiveDocument.1">
+                  <p:embed/>
+                </p:oleObj>
+              </mc:Choice>
+              <mc:Fallback>
+                <p:oleObj name="Diapositive think-cell" r:id="rId11" imgW="7772400" imgH="10058400" progId="TCLayout.ActiveDocument.1">
+                  <p:embed/>
+                  <p:pic>
+                    <p:nvPicPr>
+                      <p:cNvPr id="0" name=""/>
+                      <p:cNvPicPr/>
+                      <p:nvPr/>
+                    </p:nvPicPr>
+                    <p:blipFill>
+                      <a:blip r:embed="rId12"/>
+                      <a:stretch>
+                        <a:fillRect/>
+                      </a:stretch>
+                    </p:blipFill>
+                    <p:spPr>
+                      <a:xfrm>
+                        <a:off x="1588" y="1588"/>
+                        <a:ext cx="1227" cy="1588"/>
+                      </a:xfrm>
+                      <a:prstGeom prst="rect">
+                        <a:avLst/>
+                      </a:prstGeom>
+                    </p:spPr>
+                  </p:pic>
+                </p:oleObj>
+              </mc:Fallback>
+            </mc:AlternateContent>
+          </a:graphicData>
+        </a:graphic>
+      </p:graphicFrame>
     </p:spTree>
     <p:extLst>
       <p:ext uri="{BB962C8B-B14F-4D97-AF65-F5344CB8AC3E}">
@@ -16797,7 +16863,7 @@
             </p:custDataLst>
             <p:extLst>
               <p:ext uri="{D42A27DB-BD31-4B8C-83A1-F6EECF244321}">
-                <p14:modId xmlns:p14="http://schemas.microsoft.com/office/powerpoint/2010/main" val="235299185"/>
+                <p14:modId xmlns:p14="http://schemas.microsoft.com/office/powerpoint/2010/main" val="3573156804"/>
               </p:ext>
             </p:extLst>
           </p:nvPr>
@@ -16810,7 +16876,7 @@
           <a:graphicData uri="http://schemas.openxmlformats.org/presentationml/2006/ole">
             <mc:AlternateContent xmlns:mc="http://schemas.openxmlformats.org/markup-compatibility/2006">
               <mc:Choice xmlns:v="urn:schemas-microsoft-com:vml" Requires="v">
-                <p:oleObj spid="_x0000_s2051" name="Diapositive think-cell" r:id="rId9" imgW="270" imgH="270" progId="TCLayout.ActiveDocument.1">
+                <p:oleObj spid="_x0000_s2057" name="Diapositive think-cell" r:id="rId9" imgW="270" imgH="270" progId="TCLayout.ActiveDocument.1">
                   <p:embed/>
                 </p:oleObj>
               </mc:Choice>
@@ -17135,6 +17201,72 @@
           <a:chExt cx="0" cy="0"/>
         </a:xfrm>
       </p:grpSpPr>
+      <p:graphicFrame>
+        <p:nvGraphicFramePr>
+          <p:cNvPr id="2" name="Objet 1" hidden="1">
+            <a:extLst>
+              <a:ext uri="{FF2B5EF4-FFF2-40B4-BE49-F238E27FC236}">
+                <a16:creationId xmlns:a16="http://schemas.microsoft.com/office/drawing/2014/main" id="{F2E392D7-7FCE-7249-8D17-8B64258F4017}"/>
+              </a:ext>
+            </a:extLst>
+          </p:cNvPr>
+          <p:cNvGraphicFramePr>
+            <a:graphicFrameLocks noChangeAspect="1"/>
+          </p:cNvGraphicFramePr>
+          <p:nvPr userDrawn="1">
+            <p:custDataLst>
+              <p:tags r:id="rId6"/>
+            </p:custDataLst>
+            <p:extLst>
+              <p:ext uri="{D42A27DB-BD31-4B8C-83A1-F6EECF244321}">
+                <p14:modId xmlns:p14="http://schemas.microsoft.com/office/powerpoint/2010/main" val="367742718"/>
+              </p:ext>
+            </p:extLst>
+          </p:nvPr>
+        </p:nvGraphicFramePr>
+        <p:xfrm>
+          <a:off x="1588" y="1588"/>
+          <a:ext cx="1227" cy="1588"/>
+        </p:xfrm>
+        <a:graphic>
+          <a:graphicData uri="http://schemas.openxmlformats.org/presentationml/2006/ole">
+            <mc:AlternateContent xmlns:mc="http://schemas.openxmlformats.org/markup-compatibility/2006">
+              <mc:Choice xmlns:v="urn:schemas-microsoft-com:vml" Requires="v">
+                <p:oleObj spid="_x0000_s17413" name="Diapositive think-cell" r:id="rId7" imgW="7772400" imgH="10058400" progId="TCLayout.ActiveDocument.1">
+                  <p:embed/>
+                </p:oleObj>
+              </mc:Choice>
+              <mc:Fallback>
+                <p:oleObj name="Diapositive think-cell" r:id="rId7" imgW="7772400" imgH="10058400" progId="TCLayout.ActiveDocument.1">
+                  <p:embed/>
+                  <p:pic>
+                    <p:nvPicPr>
+                      <p:cNvPr id="0" name=""/>
+                      <p:cNvPicPr/>
+                      <p:nvPr/>
+                    </p:nvPicPr>
+                    <p:blipFill>
+                      <a:blip r:embed="rId8"/>
+                      <a:stretch>
+                        <a:fillRect/>
+                      </a:stretch>
+                    </p:blipFill>
+                    <p:spPr>
+                      <a:xfrm>
+                        <a:off x="1588" y="1588"/>
+                        <a:ext cx="1227" cy="1588"/>
+                      </a:xfrm>
+                      <a:prstGeom prst="rect">
+                        <a:avLst/>
+                      </a:prstGeom>
+                    </p:spPr>
+                  </p:pic>
+                </p:oleObj>
+              </mc:Fallback>
+            </mc:AlternateContent>
+          </a:graphicData>
+        </a:graphic>
+      </p:graphicFrame>
     </p:spTree>
     <p:extLst>
       <p:ext uri="{BB962C8B-B14F-4D97-AF65-F5344CB8AC3E}">
@@ -17436,7 +17568,7 @@
             </p:custDataLst>
             <p:extLst>
               <p:ext uri="{D42A27DB-BD31-4B8C-83A1-F6EECF244321}">
-                <p14:modId xmlns:p14="http://schemas.microsoft.com/office/powerpoint/2010/main" val="2968353919"/>
+                <p14:modId xmlns:p14="http://schemas.microsoft.com/office/powerpoint/2010/main" val="3419098021"/>
               </p:ext>
             </p:extLst>
           </p:nvPr>
@@ -17449,7 +17581,7 @@
           <a:graphicData uri="http://schemas.openxmlformats.org/presentationml/2006/ole">
             <mc:AlternateContent xmlns:mc="http://schemas.openxmlformats.org/markup-compatibility/2006">
               <mc:Choice xmlns:v="urn:schemas-microsoft-com:vml" Requires="v">
-                <p:oleObj spid="_x0000_s4099" name="Diapositive think-cell" r:id="rId7" imgW="270" imgH="270" progId="TCLayout.ActiveDocument.1">
+                <p:oleObj spid="_x0000_s4105" name="Diapositive think-cell" r:id="rId7" imgW="270" imgH="270" progId="TCLayout.ActiveDocument.1">
                   <p:embed/>
                 </p:oleObj>
               </mc:Choice>
@@ -17784,7 +17916,7 @@
             </p:custDataLst>
             <p:extLst>
               <p:ext uri="{D42A27DB-BD31-4B8C-83A1-F6EECF244321}">
-                <p14:modId xmlns:p14="http://schemas.microsoft.com/office/powerpoint/2010/main" val="1437399687"/>
+                <p14:modId xmlns:p14="http://schemas.microsoft.com/office/powerpoint/2010/main" val="2898984297"/>
               </p:ext>
             </p:extLst>
           </p:nvPr>
@@ -17797,7 +17929,7 @@
           <a:graphicData uri="http://schemas.openxmlformats.org/presentationml/2006/ole">
             <mc:AlternateContent xmlns:mc="http://schemas.openxmlformats.org/markup-compatibility/2006">
               <mc:Choice xmlns:v="urn:schemas-microsoft-com:vml" Requires="v">
-                <p:oleObj spid="_x0000_s6147" name="Diapositive think-cell" r:id="rId8" imgW="270" imgH="270" progId="TCLayout.ActiveDocument.1">
+                <p:oleObj spid="_x0000_s6153" name="Diapositive think-cell" r:id="rId8" imgW="270" imgH="270" progId="TCLayout.ActiveDocument.1">
                   <p:embed/>
                 </p:oleObj>
               </mc:Choice>
@@ -18131,6 +18263,11 @@
             <p:custDataLst>
               <p:tags r:id="rId7"/>
             </p:custDataLst>
+            <p:extLst>
+              <p:ext uri="{D42A27DB-BD31-4B8C-83A1-F6EECF244321}">
+                <p14:modId xmlns:p14="http://schemas.microsoft.com/office/powerpoint/2010/main" val="2005664710"/>
+              </p:ext>
+            </p:extLst>
           </p:nvPr>
         </p:nvGraphicFramePr>
         <p:xfrm>
@@ -18141,7 +18278,7 @@
           <a:graphicData uri="http://schemas.openxmlformats.org/presentationml/2006/ole">
             <mc:AlternateContent xmlns:mc="http://schemas.openxmlformats.org/markup-compatibility/2006">
               <mc:Choice xmlns:v="urn:schemas-microsoft-com:vml" Requires="v">
-                <p:oleObj spid="_x0000_s8195" name="Diapositive think-cell" r:id="rId8" imgW="270" imgH="270" progId="TCLayout.ActiveDocument.1">
+                <p:oleObj spid="_x0000_s8201" name="Diapositive think-cell" r:id="rId8" imgW="270" imgH="270" progId="TCLayout.ActiveDocument.1">
                   <p:embed/>
                 </p:oleObj>
               </mc:Choice>
@@ -18475,6 +18612,11 @@
             <p:custDataLst>
               <p:tags r:id="rId7"/>
             </p:custDataLst>
+            <p:extLst>
+              <p:ext uri="{D42A27DB-BD31-4B8C-83A1-F6EECF244321}">
+                <p14:modId xmlns:p14="http://schemas.microsoft.com/office/powerpoint/2010/main" val="4201904736"/>
+              </p:ext>
+            </p:extLst>
           </p:nvPr>
         </p:nvGraphicFramePr>
         <p:xfrm>
@@ -18485,7 +18627,7 @@
           <a:graphicData uri="http://schemas.openxmlformats.org/presentationml/2006/ole">
             <mc:AlternateContent xmlns:mc="http://schemas.openxmlformats.org/markup-compatibility/2006">
               <mc:Choice xmlns:v="urn:schemas-microsoft-com:vml" Requires="v">
-                <p:oleObj spid="_x0000_s10243" name="Diapositive think-cell" r:id="rId8" imgW="270" imgH="270" progId="TCLayout.ActiveDocument.1">
+                <p:oleObj spid="_x0000_s10249" name="Diapositive think-cell" r:id="rId8" imgW="270" imgH="270" progId="TCLayout.ActiveDocument.1">
                   <p:embed/>
                 </p:oleObj>
               </mc:Choice>
@@ -18804,165 +18946,72 @@
           <a:chExt cx="0" cy="0"/>
         </a:xfrm>
       </p:grpSpPr>
-      <p:grpSp>
-        <p:nvGrpSpPr>
-          <p:cNvPr id="5" name="Groupe 4">
+      <p:graphicFrame>
+        <p:nvGraphicFramePr>
+          <p:cNvPr id="18" name="Objet 17" hidden="1">
             <a:extLst>
               <a:ext uri="{FF2B5EF4-FFF2-40B4-BE49-F238E27FC236}">
-                <a16:creationId xmlns:a16="http://schemas.microsoft.com/office/drawing/2014/main" id="{F515D368-AB9E-4A29-8CDB-F0D8F1A1D4D3}"/>
+                <a16:creationId xmlns:a16="http://schemas.microsoft.com/office/drawing/2014/main" id="{FC434811-2158-D34C-8A08-D645E883CDD5}"/>
               </a:ext>
             </a:extLst>
           </p:cNvPr>
-          <p:cNvGrpSpPr/>
-          <p:nvPr/>
-        </p:nvGrpSpPr>
-        <p:grpSpPr>
-          <a:xfrm>
-            <a:off x="68943" y="1363312"/>
-            <a:ext cx="9006114" cy="2580444"/>
-            <a:chOff x="514129" y="1047016"/>
-            <a:chExt cx="24171718" cy="6669212"/>
-          </a:xfrm>
-        </p:grpSpPr>
-        <p:pic>
-          <p:nvPicPr>
-            <p:cNvPr id="2" name="Graphique 1">
-              <a:extLst>
-                <a:ext uri="{FF2B5EF4-FFF2-40B4-BE49-F238E27FC236}">
-                  <a16:creationId xmlns:a16="http://schemas.microsoft.com/office/drawing/2014/main" id="{E0A4D984-9D24-4D71-B171-17A6E7370276}"/>
-                </a:ext>
-              </a:extLst>
-            </p:cNvPr>
-            <p:cNvPicPr>
-              <a:picLocks noChangeAspect="1"/>
-            </p:cNvPicPr>
-            <p:nvPr/>
-          </p:nvPicPr>
-          <p:blipFill>
-            <a:blip r:embed="rId2">
-              <a:extLst>
-                <a:ext uri="{96DAC541-7B7A-43D3-8B79-37D633B846F1}">
-                  <asvg:svgBlip xmlns:asvg="http://schemas.microsoft.com/office/drawing/2016/SVG/main" r:embed="rId3"/>
-                </a:ext>
-              </a:extLst>
-            </a:blip>
-            <a:stretch>
-              <a:fillRect/>
-            </a:stretch>
-          </p:blipFill>
-          <p:spPr>
-            <a:xfrm>
-              <a:off x="514129" y="1047016"/>
-              <a:ext cx="24171718" cy="6669212"/>
-            </a:xfrm>
-            <a:prstGeom prst="rect">
-              <a:avLst/>
-            </a:prstGeom>
-          </p:spPr>
-        </p:pic>
-        <p:sp>
-          <p:nvSpPr>
-            <p:cNvPr id="3" name="ZoneTexte 2">
-              <a:extLst>
-                <a:ext uri="{FF2B5EF4-FFF2-40B4-BE49-F238E27FC236}">
-                  <a16:creationId xmlns:a16="http://schemas.microsoft.com/office/drawing/2014/main" id="{A4615FE8-2ABF-4500-990D-350AB5BFDF57}"/>
-                </a:ext>
-              </a:extLst>
-            </p:cNvPr>
-            <p:cNvSpPr txBox="1"/>
-            <p:nvPr/>
-          </p:nvSpPr>
-          <p:spPr>
-            <a:xfrm>
-              <a:off x="11020942" y="4743101"/>
-              <a:ext cx="1701846" cy="636363"/>
-            </a:xfrm>
-            <a:prstGeom prst="rect">
-              <a:avLst/>
-            </a:prstGeom>
-            <a:noFill/>
-          </p:spPr>
-          <p:txBody>
-            <a:bodyPr wrap="square" rtlCol="0">
-              <a:spAutoFit/>
-            </a:bodyPr>
-            <a:lstStyle/>
-            <a:p>
-              <a:r>
-                <a:rPr lang="fr-FR" sz="500" dirty="0">
-                  <a:solidFill>
-                    <a:srgbClr val="27509B"/>
-                  </a:solidFill>
-                  <a:latin typeface="Gotham Rounded Bold" pitchFamily="50" charset="0"/>
-                </a:rPr>
-                <a:t>HEALTH</a:t>
-              </a:r>
-            </a:p>
-            <a:p>
-              <a:r>
-                <a:rPr lang="fr-FR" sz="500" dirty="0">
-                  <a:solidFill>
-                    <a:srgbClr val="27509B"/>
-                  </a:solidFill>
-                  <a:latin typeface="Gotham Rounded Bold" pitchFamily="50" charset="0"/>
-                </a:rPr>
-                <a:t> CHECK</a:t>
-              </a:r>
-            </a:p>
-          </p:txBody>
-        </p:sp>
-        <p:sp>
-          <p:nvSpPr>
-            <p:cNvPr id="4" name="ZoneTexte 3">
-              <a:extLst>
-                <a:ext uri="{FF2B5EF4-FFF2-40B4-BE49-F238E27FC236}">
-                  <a16:creationId xmlns:a16="http://schemas.microsoft.com/office/drawing/2014/main" id="{382A4056-3D21-4D81-96FE-5B83C4677083}"/>
-                </a:ext>
-              </a:extLst>
-            </p:cNvPr>
-            <p:cNvSpPr txBox="1"/>
-            <p:nvPr/>
-          </p:nvSpPr>
-          <p:spPr>
-            <a:xfrm>
-              <a:off x="17343701" y="4743098"/>
-              <a:ext cx="1701846" cy="636363"/>
-            </a:xfrm>
-            <a:prstGeom prst="rect">
-              <a:avLst/>
-            </a:prstGeom>
-            <a:noFill/>
-          </p:spPr>
-          <p:txBody>
-            <a:bodyPr wrap="square" rtlCol="0">
-              <a:spAutoFit/>
-            </a:bodyPr>
-            <a:lstStyle/>
-            <a:p>
-              <a:r>
-                <a:rPr lang="fr-FR" sz="500" dirty="0">
-                  <a:solidFill>
-                    <a:srgbClr val="27509B"/>
-                  </a:solidFill>
-                  <a:latin typeface="Gotham Rounded Bold" pitchFamily="50" charset="0"/>
-                </a:rPr>
-                <a:t>HEALTH</a:t>
-              </a:r>
-            </a:p>
-            <a:p>
-              <a:r>
-                <a:rPr lang="fr-FR" sz="500" dirty="0">
-                  <a:solidFill>
-                    <a:srgbClr val="27509B"/>
-                  </a:solidFill>
-                  <a:latin typeface="Gotham Rounded Bold" pitchFamily="50" charset="0"/>
-                </a:rPr>
-                <a:t> CHECK</a:t>
-              </a:r>
-            </a:p>
-          </p:txBody>
-        </p:sp>
-      </p:grpSp>
+          <p:cNvGraphicFramePr>
+            <a:graphicFrameLocks noChangeAspect="1"/>
+          </p:cNvGraphicFramePr>
+          <p:nvPr>
+            <p:custDataLst>
+              <p:tags r:id="rId2"/>
+            </p:custDataLst>
+            <p:extLst>
+              <p:ext uri="{D42A27DB-BD31-4B8C-83A1-F6EECF244321}">
+                <p14:modId xmlns:p14="http://schemas.microsoft.com/office/powerpoint/2010/main" val="534354821"/>
+              </p:ext>
+            </p:extLst>
+          </p:nvPr>
+        </p:nvGraphicFramePr>
+        <p:xfrm>
+          <a:off x="1588" y="1588"/>
+          <a:ext cx="1227" cy="1588"/>
+        </p:xfrm>
+        <a:graphic>
+          <a:graphicData uri="http://schemas.openxmlformats.org/presentationml/2006/ole">
+            <mc:AlternateContent xmlns:mc="http://schemas.openxmlformats.org/markup-compatibility/2006">
+              <mc:Choice xmlns:v="urn:schemas-microsoft-com:vml" Requires="v">
+                <p:oleObj spid="_x0000_s18439" name="Diapositive think-cell" r:id="rId4" imgW="7772400" imgH="10058400" progId="TCLayout.ActiveDocument.1">
+                  <p:embed/>
+                </p:oleObj>
+              </mc:Choice>
+              <mc:Fallback>
+                <p:oleObj name="Diapositive think-cell" r:id="rId4" imgW="7772400" imgH="10058400" progId="TCLayout.ActiveDocument.1">
+                  <p:embed/>
+                  <p:pic>
+                    <p:nvPicPr>
+                      <p:cNvPr id="0" name=""/>
+                      <p:cNvPicPr/>
+                      <p:nvPr/>
+                    </p:nvPicPr>
+                    <p:blipFill>
+                      <a:blip r:embed="rId5"/>
+                      <a:stretch>
+                        <a:fillRect/>
+                      </a:stretch>
+                    </p:blipFill>
+                    <p:spPr>
+                      <a:xfrm>
+                        <a:off x="1588" y="1588"/>
+                        <a:ext cx="1227" cy="1588"/>
+                      </a:xfrm>
+                      <a:prstGeom prst="rect">
+                        <a:avLst/>
+                      </a:prstGeom>
+                    </p:spPr>
+                  </p:pic>
+                </p:oleObj>
+              </mc:Fallback>
+            </mc:AlternateContent>
+          </a:graphicData>
+        </a:graphic>
+      </p:graphicFrame>
       <p:sp>
         <p:nvSpPr>
           <p:cNvPr id="6" name="ZoneTexte 5">
@@ -18978,7 +19027,7 @@
         <p:spPr>
           <a:xfrm>
             <a:off x="143895" y="67121"/>
-            <a:ext cx="2823593" cy="369332"/>
+            <a:ext cx="3512500" cy="369332"/>
           </a:xfrm>
           <a:prstGeom prst="rect">
             <a:avLst/>
@@ -19009,7 +19058,7 @@
               <a:defRPr/>
             </a:pPr>
             <a:r>
-              <a:rPr kumimoji="0" lang="fr-FR" b="0" i="0" u="none" strike="noStrike" kern="1200" cap="none" spc="0" normalizeH="0" baseline="0" noProof="0" dirty="0">
+              <a:rPr kumimoji="0" lang="fr-FR" u="none" strike="noStrike" kern="1200" cap="none" spc="0" normalizeH="0" baseline="0" noProof="0" dirty="0">
                 <a:ln>
                   <a:noFill/>
                 </a:ln>
@@ -19019,7 +19068,7 @@
                 <a:effectLst/>
                 <a:uLnTx/>
                 <a:uFillTx/>
-                <a:latin typeface="Gotham Rounded Bold" pitchFamily="50" charset="0"/>
+                <a:latin typeface="Michelin Black" panose="02000000000000000000" pitchFamily="2" charset="0"/>
                 <a:cs typeface="Aharoni" panose="02010803020104030203" pitchFamily="2" charset="-79"/>
               </a:rPr>
               <a:t>PRODUCT LIFE CYCLE</a:t>
@@ -19041,8 +19090,8 @@
         </p:nvGrpSpPr>
         <p:grpSpPr>
           <a:xfrm>
-            <a:off x="5031467" y="67121"/>
-            <a:ext cx="4089967" cy="1080672"/>
+            <a:off x="5957321" y="67121"/>
+            <a:ext cx="3164113" cy="836038"/>
             <a:chOff x="3489324" y="450850"/>
             <a:chExt cx="1509088" cy="447675"/>
           </a:xfrm>
@@ -19062,10 +19111,10 @@
             <p:nvPr/>
           </p:nvPicPr>
           <p:blipFill rotWithShape="1">
-            <a:blip r:embed="rId2">
+            <a:blip r:embed="rId6">
               <a:extLst>
                 <a:ext uri="{96DAC541-7B7A-43D3-8B79-37D633B846F1}">
-                  <asvg:svgBlip xmlns:asvg="http://schemas.microsoft.com/office/drawing/2016/SVG/main" r:embed="rId3"/>
+                  <asvg:svgBlip xmlns:asvg="http://schemas.microsoft.com/office/drawing/2016/SVG/main" r:embed="rId7"/>
                 </a:ext>
               </a:extLst>
             </a:blip>
@@ -19097,10 +19146,10 @@
             <p:nvPr/>
           </p:nvPicPr>
           <p:blipFill rotWithShape="1">
-            <a:blip r:embed="rId2">
+            <a:blip r:embed="rId6">
               <a:extLst>
                 <a:ext uri="{96DAC541-7B7A-43D3-8B79-37D633B846F1}">
-                  <asvg:svgBlip xmlns:asvg="http://schemas.microsoft.com/office/drawing/2016/SVG/main" r:embed="rId3"/>
+                  <asvg:svgBlip xmlns:asvg="http://schemas.microsoft.com/office/drawing/2016/SVG/main" r:embed="rId7"/>
                 </a:ext>
               </a:extLst>
             </a:blip>
@@ -19120,90 +19169,6 @@
       </p:grpSp>
       <p:sp>
         <p:nvSpPr>
-          <p:cNvPr id="7" name="ZoneTexte 6">
-            <a:extLst>
-              <a:ext uri="{FF2B5EF4-FFF2-40B4-BE49-F238E27FC236}">
-                <a16:creationId xmlns:a16="http://schemas.microsoft.com/office/drawing/2014/main" id="{2D1F48B4-F11B-4A83-BA61-17138F1ED58D}"/>
-              </a:ext>
-            </a:extLst>
-          </p:cNvPr>
-          <p:cNvSpPr txBox="1"/>
-          <p:nvPr/>
-        </p:nvSpPr>
-        <p:spPr>
-          <a:xfrm>
-            <a:off x="1068704" y="3466702"/>
-            <a:ext cx="1990725" cy="246221"/>
-          </a:xfrm>
-          <a:prstGeom prst="rect">
-            <a:avLst/>
-          </a:prstGeom>
-          <a:solidFill>
-            <a:schemeClr val="bg1"/>
-          </a:solidFill>
-        </p:spPr>
-        <p:txBody>
-          <a:bodyPr wrap="square" rtlCol="0">
-            <a:spAutoFit/>
-          </a:bodyPr>
-          <a:lstStyle/>
-          <a:p>
-            <a:r>
-              <a:rPr lang="fr-FR" sz="1000" dirty="0">
-                <a:solidFill>
-                  <a:srgbClr val="27509B"/>
-                </a:solidFill>
-                <a:latin typeface="Gotham Rounded Bold" pitchFamily="50" charset="0"/>
-              </a:rPr>
-              <a:t>SOLUTION - PROBLEM FIX</a:t>
-            </a:r>
-          </a:p>
-        </p:txBody>
-      </p:sp>
-      <p:sp>
-        <p:nvSpPr>
-          <p:cNvPr id="8" name="ZoneTexte 7">
-            <a:extLst>
-              <a:ext uri="{FF2B5EF4-FFF2-40B4-BE49-F238E27FC236}">
-                <a16:creationId xmlns:a16="http://schemas.microsoft.com/office/drawing/2014/main" id="{EF993AC2-FE4D-489C-A42B-684353DEC631}"/>
-              </a:ext>
-            </a:extLst>
-          </p:cNvPr>
-          <p:cNvSpPr txBox="1"/>
-          <p:nvPr/>
-        </p:nvSpPr>
-        <p:spPr>
-          <a:xfrm>
-            <a:off x="3687716" y="3479534"/>
-            <a:ext cx="1990725" cy="246221"/>
-          </a:xfrm>
-          <a:prstGeom prst="rect">
-            <a:avLst/>
-          </a:prstGeom>
-          <a:solidFill>
-            <a:schemeClr val="bg1"/>
-          </a:solidFill>
-        </p:spPr>
-        <p:txBody>
-          <a:bodyPr wrap="square" rtlCol="0">
-            <a:spAutoFit/>
-          </a:bodyPr>
-          <a:lstStyle/>
-          <a:p>
-            <a:r>
-              <a:rPr lang="fr-FR" sz="1000" dirty="0">
-                <a:solidFill>
-                  <a:srgbClr val="27509B"/>
-                </a:solidFill>
-                <a:latin typeface="Gotham Rounded Bold" pitchFamily="50" charset="0"/>
-              </a:rPr>
-              <a:t>PRODUCT – MARKET FIT</a:t>
-            </a:r>
-          </a:p>
-        </p:txBody>
-      </p:sp>
-      <p:sp>
-        <p:nvSpPr>
           <p:cNvPr id="10" name="ZoneTexte 9">
             <a:extLst>
               <a:ext uri="{FF2B5EF4-FFF2-40B4-BE49-F238E27FC236}">
@@ -19216,7 +19181,7 @@
         </p:nvSpPr>
         <p:spPr>
           <a:xfrm>
-            <a:off x="2402727" y="4159275"/>
+            <a:off x="2906370" y="4474118"/>
             <a:ext cx="4943475" cy="461665"/>
           </a:xfrm>
           <a:prstGeom prst="rect">
@@ -19232,6 +19197,7 @@
           </a:bodyPr>
           <a:lstStyle/>
           <a:p>
+            <a:pPr algn="ctr"/>
             <a:r>
               <a:rPr lang="fr-FR" sz="2400" b="1" dirty="0">
                 <a:solidFill>
@@ -19259,7 +19225,7 @@
           <p:nvPr/>
         </p:nvPicPr>
         <p:blipFill>
-          <a:blip r:embed="rId4"/>
+          <a:blip r:embed="rId8"/>
           <a:stretch>
             <a:fillRect/>
           </a:stretch>
@@ -19289,10 +19255,10 @@
           <p:nvPr/>
         </p:nvPicPr>
         <p:blipFill>
-          <a:blip r:embed="rId5">
+          <a:blip r:embed="rId9">
             <a:extLst>
               <a:ext uri="{96DAC541-7B7A-43D3-8B79-37D633B846F1}">
-                <asvg:svgBlip xmlns:asvg="http://schemas.microsoft.com/office/drawing/2016/SVG/main" r:embed="rId6"/>
+                <asvg:svgBlip xmlns:asvg="http://schemas.microsoft.com/office/drawing/2016/SVG/main" r:embed="rId10"/>
               </a:ext>
             </a:extLst>
           </a:blip>
@@ -19310,12 +19276,492 @@
           </a:prstGeom>
         </p:spPr>
       </p:pic>
+      <p:grpSp>
+        <p:nvGrpSpPr>
+          <p:cNvPr id="23" name="Groupe 22">
+            <a:extLst>
+              <a:ext uri="{FF2B5EF4-FFF2-40B4-BE49-F238E27FC236}">
+                <a16:creationId xmlns:a16="http://schemas.microsoft.com/office/drawing/2014/main" id="{2D54C6E9-5978-9148-B85D-57C0422CA4A7}"/>
+              </a:ext>
+            </a:extLst>
+          </p:cNvPr>
+          <p:cNvGrpSpPr/>
+          <p:nvPr/>
+        </p:nvGrpSpPr>
+        <p:grpSpPr>
+          <a:xfrm>
+            <a:off x="115320" y="860085"/>
+            <a:ext cx="9006114" cy="2698037"/>
+            <a:chOff x="68943" y="1346776"/>
+            <a:chExt cx="9006114" cy="2698037"/>
+          </a:xfrm>
+        </p:grpSpPr>
+        <p:grpSp>
+          <p:nvGrpSpPr>
+            <p:cNvPr id="21" name="Groupe 20">
+              <a:extLst>
+                <a:ext uri="{FF2B5EF4-FFF2-40B4-BE49-F238E27FC236}">
+                  <a16:creationId xmlns:a16="http://schemas.microsoft.com/office/drawing/2014/main" id="{4DF1B3A0-341F-3D40-BBFE-F6E7B1844848}"/>
+                </a:ext>
+              </a:extLst>
+            </p:cNvPr>
+            <p:cNvGrpSpPr/>
+            <p:nvPr/>
+          </p:nvGrpSpPr>
+          <p:grpSpPr>
+            <a:xfrm>
+              <a:off x="68943" y="1346776"/>
+              <a:ext cx="9006114" cy="2698037"/>
+              <a:chOff x="68943" y="1320652"/>
+              <a:chExt cx="9006114" cy="2698037"/>
+            </a:xfrm>
+          </p:grpSpPr>
+          <p:grpSp>
+            <p:nvGrpSpPr>
+              <p:cNvPr id="16" name="Groupe 15">
+                <a:extLst>
+                  <a:ext uri="{FF2B5EF4-FFF2-40B4-BE49-F238E27FC236}">
+                    <a16:creationId xmlns:a16="http://schemas.microsoft.com/office/drawing/2014/main" id="{2D197397-FE9F-CE44-9EAE-47DAFDD9E372}"/>
+                  </a:ext>
+                </a:extLst>
+              </p:cNvPr>
+              <p:cNvGrpSpPr/>
+              <p:nvPr/>
+            </p:nvGrpSpPr>
+            <p:grpSpPr>
+              <a:xfrm>
+                <a:off x="68943" y="1320652"/>
+                <a:ext cx="9006114" cy="2580444"/>
+                <a:chOff x="68943" y="1363312"/>
+                <a:chExt cx="9006114" cy="2580444"/>
+              </a:xfrm>
+            </p:grpSpPr>
+            <p:grpSp>
+              <p:nvGrpSpPr>
+                <p:cNvPr id="5" name="Groupe 4">
+                  <a:extLst>
+                    <a:ext uri="{FF2B5EF4-FFF2-40B4-BE49-F238E27FC236}">
+                      <a16:creationId xmlns:a16="http://schemas.microsoft.com/office/drawing/2014/main" id="{F515D368-AB9E-4A29-8CDB-F0D8F1A1D4D3}"/>
+                    </a:ext>
+                  </a:extLst>
+                </p:cNvPr>
+                <p:cNvGrpSpPr/>
+                <p:nvPr/>
+              </p:nvGrpSpPr>
+              <p:grpSpPr>
+                <a:xfrm>
+                  <a:off x="68943" y="1363312"/>
+                  <a:ext cx="9006114" cy="2580444"/>
+                  <a:chOff x="514129" y="1047016"/>
+                  <a:chExt cx="24171718" cy="6669212"/>
+                </a:xfrm>
+              </p:grpSpPr>
+              <p:pic>
+                <p:nvPicPr>
+                  <p:cNvPr id="2" name="Graphique 1">
+                    <a:extLst>
+                      <a:ext uri="{FF2B5EF4-FFF2-40B4-BE49-F238E27FC236}">
+                        <a16:creationId xmlns:a16="http://schemas.microsoft.com/office/drawing/2014/main" id="{E0A4D984-9D24-4D71-B171-17A6E7370276}"/>
+                      </a:ext>
+                    </a:extLst>
+                  </p:cNvPr>
+                  <p:cNvPicPr>
+                    <a:picLocks noChangeAspect="1"/>
+                  </p:cNvPicPr>
+                  <p:nvPr/>
+                </p:nvPicPr>
+                <p:blipFill>
+                  <a:blip r:embed="rId6">
+                    <a:extLst>
+                      <a:ext uri="{96DAC541-7B7A-43D3-8B79-37D633B846F1}">
+                        <asvg:svgBlip xmlns:asvg="http://schemas.microsoft.com/office/drawing/2016/SVG/main" r:embed="rId7"/>
+                      </a:ext>
+                    </a:extLst>
+                  </a:blip>
+                  <a:stretch>
+                    <a:fillRect/>
+                  </a:stretch>
+                </p:blipFill>
+                <p:spPr>
+                  <a:xfrm>
+                    <a:off x="514129" y="1047016"/>
+                    <a:ext cx="24171718" cy="6669212"/>
+                  </a:xfrm>
+                  <a:prstGeom prst="rect">
+                    <a:avLst/>
+                  </a:prstGeom>
+                </p:spPr>
+              </p:pic>
+              <p:sp>
+                <p:nvSpPr>
+                  <p:cNvPr id="3" name="ZoneTexte 2">
+                    <a:extLst>
+                      <a:ext uri="{FF2B5EF4-FFF2-40B4-BE49-F238E27FC236}">
+                        <a16:creationId xmlns:a16="http://schemas.microsoft.com/office/drawing/2014/main" id="{A4615FE8-2ABF-4500-990D-350AB5BFDF57}"/>
+                      </a:ext>
+                    </a:extLst>
+                  </p:cNvPr>
+                  <p:cNvSpPr txBox="1"/>
+                  <p:nvPr/>
+                </p:nvSpPr>
+                <p:spPr>
+                  <a:xfrm>
+                    <a:off x="11020942" y="4743101"/>
+                    <a:ext cx="1701846" cy="636363"/>
+                  </a:xfrm>
+                  <a:prstGeom prst="rect">
+                    <a:avLst/>
+                  </a:prstGeom>
+                  <a:noFill/>
+                </p:spPr>
+                <p:txBody>
+                  <a:bodyPr wrap="square" rtlCol="0">
+                    <a:spAutoFit/>
+                  </a:bodyPr>
+                  <a:lstStyle/>
+                  <a:p>
+                    <a:r>
+                      <a:rPr lang="fr-FR" sz="500" dirty="0">
+                        <a:solidFill>
+                          <a:srgbClr val="27509B"/>
+                        </a:solidFill>
+                        <a:latin typeface="Gotham Rounded Bold" pitchFamily="50" charset="0"/>
+                      </a:rPr>
+                      <a:t>HEALTH</a:t>
+                    </a:r>
+                  </a:p>
+                  <a:p>
+                    <a:r>
+                      <a:rPr lang="fr-FR" sz="500" dirty="0">
+                        <a:solidFill>
+                          <a:srgbClr val="27509B"/>
+                        </a:solidFill>
+                        <a:latin typeface="Gotham Rounded Bold" pitchFamily="50" charset="0"/>
+                      </a:rPr>
+                      <a:t> CHECK</a:t>
+                    </a:r>
+                  </a:p>
+                </p:txBody>
+              </p:sp>
+              <p:sp>
+                <p:nvSpPr>
+                  <p:cNvPr id="4" name="ZoneTexte 3">
+                    <a:extLst>
+                      <a:ext uri="{FF2B5EF4-FFF2-40B4-BE49-F238E27FC236}">
+                        <a16:creationId xmlns:a16="http://schemas.microsoft.com/office/drawing/2014/main" id="{382A4056-3D21-4D81-96FE-5B83C4677083}"/>
+                      </a:ext>
+                    </a:extLst>
+                  </p:cNvPr>
+                  <p:cNvSpPr txBox="1"/>
+                  <p:nvPr/>
+                </p:nvSpPr>
+                <p:spPr>
+                  <a:xfrm>
+                    <a:off x="17343701" y="4743098"/>
+                    <a:ext cx="1701846" cy="636363"/>
+                  </a:xfrm>
+                  <a:prstGeom prst="rect">
+                    <a:avLst/>
+                  </a:prstGeom>
+                  <a:noFill/>
+                </p:spPr>
+                <p:txBody>
+                  <a:bodyPr wrap="square" rtlCol="0">
+                    <a:spAutoFit/>
+                  </a:bodyPr>
+                  <a:lstStyle/>
+                  <a:p>
+                    <a:r>
+                      <a:rPr lang="fr-FR" sz="500" dirty="0">
+                        <a:solidFill>
+                          <a:srgbClr val="27509B"/>
+                        </a:solidFill>
+                        <a:latin typeface="Gotham Rounded Bold" pitchFamily="50" charset="0"/>
+                      </a:rPr>
+                      <a:t>HEALTH</a:t>
+                    </a:r>
+                  </a:p>
+                  <a:p>
+                    <a:r>
+                      <a:rPr lang="fr-FR" sz="500" dirty="0">
+                        <a:solidFill>
+                          <a:srgbClr val="27509B"/>
+                        </a:solidFill>
+                        <a:latin typeface="Gotham Rounded Bold" pitchFamily="50" charset="0"/>
+                      </a:rPr>
+                      <a:t> CHECK</a:t>
+                    </a:r>
+                  </a:p>
+                </p:txBody>
+              </p:sp>
+            </p:grpSp>
+            <p:sp>
+              <p:nvSpPr>
+                <p:cNvPr id="7" name="ZoneTexte 6">
+                  <a:extLst>
+                    <a:ext uri="{FF2B5EF4-FFF2-40B4-BE49-F238E27FC236}">
+                      <a16:creationId xmlns:a16="http://schemas.microsoft.com/office/drawing/2014/main" id="{2D1F48B4-F11B-4A83-BA61-17138F1ED58D}"/>
+                    </a:ext>
+                  </a:extLst>
+                </p:cNvPr>
+                <p:cNvSpPr txBox="1"/>
+                <p:nvPr/>
+              </p:nvSpPr>
+              <p:spPr>
+                <a:xfrm>
+                  <a:off x="1485349" y="3466846"/>
+                  <a:ext cx="1604017" cy="246221"/>
+                </a:xfrm>
+                <a:prstGeom prst="rect">
+                  <a:avLst/>
+                </a:prstGeom>
+                <a:solidFill>
+                  <a:schemeClr val="bg1"/>
+                </a:solidFill>
+              </p:spPr>
+              <p:txBody>
+                <a:bodyPr wrap="square" rtlCol="0">
+                  <a:spAutoFit/>
+                </a:bodyPr>
+                <a:lstStyle/>
+                <a:p>
+                  <a:endParaRPr lang="fr-FR" sz="1000" dirty="0">
+                    <a:solidFill>
+                      <a:srgbClr val="27509B"/>
+                    </a:solidFill>
+                    <a:latin typeface="Gotham Rounded Bold" pitchFamily="50" charset="0"/>
+                  </a:endParaRPr>
+                </a:p>
+              </p:txBody>
+            </p:sp>
+            <p:sp>
+              <p:nvSpPr>
+                <p:cNvPr id="8" name="ZoneTexte 7">
+                  <a:extLst>
+                    <a:ext uri="{FF2B5EF4-FFF2-40B4-BE49-F238E27FC236}">
+                      <a16:creationId xmlns:a16="http://schemas.microsoft.com/office/drawing/2014/main" id="{EF993AC2-FE4D-489C-A42B-684353DEC631}"/>
+                    </a:ext>
+                  </a:extLst>
+                </p:cNvPr>
+                <p:cNvSpPr txBox="1"/>
+                <p:nvPr/>
+              </p:nvSpPr>
+              <p:spPr>
+                <a:xfrm>
+                  <a:off x="3687716" y="3479534"/>
+                  <a:ext cx="1604017" cy="246221"/>
+                </a:xfrm>
+                <a:prstGeom prst="rect">
+                  <a:avLst/>
+                </a:prstGeom>
+                <a:solidFill>
+                  <a:schemeClr val="bg1"/>
+                </a:solidFill>
+              </p:spPr>
+              <p:txBody>
+                <a:bodyPr wrap="square" rtlCol="0">
+                  <a:spAutoFit/>
+                </a:bodyPr>
+                <a:lstStyle/>
+                <a:p>
+                  <a:endParaRPr lang="fr-FR" sz="1000" dirty="0">
+                    <a:solidFill>
+                      <a:srgbClr val="27509B"/>
+                    </a:solidFill>
+                    <a:latin typeface="Gotham Rounded Bold" pitchFamily="50" charset="0"/>
+                  </a:endParaRPr>
+                </a:p>
+              </p:txBody>
+            </p:sp>
+            <p:sp>
+              <p:nvSpPr>
+                <p:cNvPr id="13" name="ZoneTexte 12">
+                  <a:extLst>
+                    <a:ext uri="{FF2B5EF4-FFF2-40B4-BE49-F238E27FC236}">
+                      <a16:creationId xmlns:a16="http://schemas.microsoft.com/office/drawing/2014/main" id="{E45D6EB2-134A-4CF7-8A33-FCD07878DC39}"/>
+                    </a:ext>
+                  </a:extLst>
+                </p:cNvPr>
+                <p:cNvSpPr txBox="1"/>
+                <p:nvPr/>
+              </p:nvSpPr>
+              <p:spPr>
+                <a:xfrm>
+                  <a:off x="6372807" y="3451313"/>
+                  <a:ext cx="795916" cy="246221"/>
+                </a:xfrm>
+                <a:prstGeom prst="rect">
+                  <a:avLst/>
+                </a:prstGeom>
+                <a:solidFill>
+                  <a:schemeClr val="bg1"/>
+                </a:solidFill>
+              </p:spPr>
+              <p:txBody>
+                <a:bodyPr wrap="square" rtlCol="0">
+                  <a:spAutoFit/>
+                </a:bodyPr>
+                <a:lstStyle/>
+                <a:p>
+                  <a:endParaRPr lang="fr-FR" sz="1000" dirty="0">
+                    <a:solidFill>
+                      <a:srgbClr val="27509B"/>
+                    </a:solidFill>
+                    <a:latin typeface="Gotham Rounded Bold" pitchFamily="50" charset="0"/>
+                  </a:endParaRPr>
+                </a:p>
+              </p:txBody>
+            </p:sp>
+          </p:grpSp>
+          <p:sp>
+            <p:nvSpPr>
+              <p:cNvPr id="40" name="ZoneTexte 39">
+                <a:extLst>
+                  <a:ext uri="{FF2B5EF4-FFF2-40B4-BE49-F238E27FC236}">
+                    <a16:creationId xmlns:a16="http://schemas.microsoft.com/office/drawing/2014/main" id="{4A96F70F-9944-47B3-8736-63CE7BADA6CC}"/>
+                  </a:ext>
+                </a:extLst>
+              </p:cNvPr>
+              <p:cNvSpPr txBox="1"/>
+              <p:nvPr/>
+            </p:nvSpPr>
+            <p:spPr>
+              <a:xfrm>
+                <a:off x="3526972" y="3649357"/>
+                <a:ext cx="2383972" cy="369332"/>
+              </a:xfrm>
+              <a:prstGeom prst="rect">
+                <a:avLst/>
+              </a:prstGeom>
+              <a:solidFill>
+                <a:schemeClr val="bg1"/>
+              </a:solidFill>
+            </p:spPr>
+            <p:txBody>
+              <a:bodyPr wrap="square" rtlCol="0">
+                <a:spAutoFit/>
+              </a:bodyPr>
+              <a:lstStyle/>
+              <a:p>
+                <a:endParaRPr lang="fr-FR" dirty="0">
+                  <a:solidFill>
+                    <a:srgbClr val="85BC25"/>
+                  </a:solidFill>
+                  <a:latin typeface="Michelin Black" panose="02000000000000000000" pitchFamily="50" charset="0"/>
+                </a:endParaRPr>
+              </a:p>
+            </p:txBody>
+          </p:sp>
+        </p:grpSp>
+        <p:sp>
+          <p:nvSpPr>
+            <p:cNvPr id="14" name="Rectangle : coins arrondis 13">
+              <a:extLst>
+                <a:ext uri="{FF2B5EF4-FFF2-40B4-BE49-F238E27FC236}">
+                  <a16:creationId xmlns:a16="http://schemas.microsoft.com/office/drawing/2014/main" id="{3C4DA4BC-8546-5B48-9AD8-064A53AD989E}"/>
+                </a:ext>
+              </a:extLst>
+            </p:cNvPr>
+            <p:cNvSpPr/>
+            <p:nvPr/>
+          </p:nvSpPr>
+          <p:spPr>
+            <a:xfrm>
+              <a:off x="3141617" y="1813913"/>
+              <a:ext cx="385354" cy="216396"/>
+            </a:xfrm>
+            <a:prstGeom prst="roundRect">
+              <a:avLst>
+                <a:gd name="adj" fmla="val 50000"/>
+              </a:avLst>
+            </a:prstGeom>
+            <a:solidFill>
+              <a:schemeClr val="bg1"/>
+            </a:solidFill>
+            <a:ln>
+              <a:noFill/>
+            </a:ln>
+          </p:spPr>
+          <p:txBody>
+            <a:bodyPr wrap="square" lIns="0" tIns="0" rIns="0" bIns="0" rtlCol="0">
+              <a:spAutoFit/>
+            </a:bodyPr>
+            <a:lstStyle/>
+            <a:p>
+              <a:pPr algn="ctr"/>
+              <a:r>
+                <a:rPr lang="fr-FR" sz="1000" b="1" dirty="0">
+                  <a:solidFill>
+                    <a:schemeClr val="tx1">
+                      <a:lumMod val="65000"/>
+                      <a:lumOff val="35000"/>
+                    </a:schemeClr>
+                  </a:solidFill>
+                  <a:latin typeface="Michelin SemiBold" panose="02000000000000000000" pitchFamily="2" charset="0"/>
+                </a:rPr>
+                <a:t>PI</a:t>
+              </a:r>
+            </a:p>
+          </p:txBody>
+        </p:sp>
+        <p:sp>
+          <p:nvSpPr>
+            <p:cNvPr id="19" name="Rectangle : coins arrondis 18">
+              <a:extLst>
+                <a:ext uri="{FF2B5EF4-FFF2-40B4-BE49-F238E27FC236}">
+                  <a16:creationId xmlns:a16="http://schemas.microsoft.com/office/drawing/2014/main" id="{D717D840-683E-2242-85CB-CA80F2C3FF5A}"/>
+                </a:ext>
+              </a:extLst>
+            </p:cNvPr>
+            <p:cNvSpPr/>
+            <p:nvPr/>
+          </p:nvSpPr>
+          <p:spPr>
+            <a:xfrm>
+              <a:off x="5459640" y="1813913"/>
+              <a:ext cx="385354" cy="216396"/>
+            </a:xfrm>
+            <a:prstGeom prst="roundRect">
+              <a:avLst>
+                <a:gd name="adj" fmla="val 50000"/>
+              </a:avLst>
+            </a:prstGeom>
+            <a:solidFill>
+              <a:schemeClr val="bg1"/>
+            </a:solidFill>
+            <a:ln>
+              <a:noFill/>
+            </a:ln>
+          </p:spPr>
+          <p:txBody>
+            <a:bodyPr wrap="square" lIns="0" tIns="0" rIns="0" bIns="0" rtlCol="0">
+              <a:spAutoFit/>
+            </a:bodyPr>
+            <a:lstStyle/>
+            <a:p>
+              <a:pPr algn="ctr"/>
+              <a:r>
+                <a:rPr lang="fr-FR" sz="1000" b="1" dirty="0">
+                  <a:solidFill>
+                    <a:schemeClr val="tx1">
+                      <a:lumMod val="65000"/>
+                      <a:lumOff val="35000"/>
+                    </a:schemeClr>
+                  </a:solidFill>
+                  <a:latin typeface="Michelin SemiBold" panose="02000000000000000000" pitchFamily="2" charset="0"/>
+                </a:rPr>
+                <a:t>PI</a:t>
+              </a:r>
+            </a:p>
+          </p:txBody>
+        </p:sp>
+      </p:grpSp>
       <p:sp>
         <p:nvSpPr>
-          <p:cNvPr id="40" name="ZoneTexte 39">
+          <p:cNvPr id="15" name="ZoneTexte 14">
             <a:extLst>
               <a:ext uri="{FF2B5EF4-FFF2-40B4-BE49-F238E27FC236}">
-                <a16:creationId xmlns:a16="http://schemas.microsoft.com/office/drawing/2014/main" id="{4A96F70F-9944-47B3-8736-63CE7BADA6CC}"/>
+                <a16:creationId xmlns:a16="http://schemas.microsoft.com/office/drawing/2014/main" id="{9FFFC430-B893-224E-822E-C57F5D8DDB62}"/>
               </a:ext>
             </a:extLst>
           </p:cNvPr>
@@ -19324,37 +19770,40 @@
         </p:nvSpPr>
         <p:spPr>
           <a:xfrm>
-            <a:off x="2269376" y="3751505"/>
-            <a:ext cx="4943475" cy="369332"/>
+            <a:off x="1156310" y="4856125"/>
+            <a:ext cx="1324402" cy="246221"/>
           </a:xfrm>
           <a:prstGeom prst="rect">
             <a:avLst/>
           </a:prstGeom>
-          <a:solidFill>
-            <a:schemeClr val="bg1"/>
-          </a:solidFill>
+          <a:noFill/>
         </p:spPr>
         <p:txBody>
-          <a:bodyPr wrap="square" rtlCol="0">
+          <a:bodyPr wrap="none" rtlCol="0">
             <a:spAutoFit/>
           </a:bodyPr>
           <a:lstStyle/>
           <a:p>
-            <a:endParaRPr lang="fr-FR" dirty="0">
-              <a:solidFill>
-                <a:srgbClr val="85BC25"/>
-              </a:solidFill>
-              <a:latin typeface="Michelin Black" panose="02000000000000000000" pitchFamily="50" charset="0"/>
-            </a:endParaRPr>
+            <a:r>
+              <a:rPr lang="en-US" sz="1000" i="1" dirty="0">
+                <a:solidFill>
+                  <a:schemeClr val="tx1">
+                    <a:lumMod val="65000"/>
+                    <a:lumOff val="35000"/>
+                  </a:schemeClr>
+                </a:solidFill>
+              </a:rPr>
+              <a:t>PI: Product Increment</a:t>
+            </a:r>
           </a:p>
         </p:txBody>
       </p:sp>
       <p:sp>
         <p:nvSpPr>
-          <p:cNvPr id="13" name="ZoneTexte 12">
+          <p:cNvPr id="22" name="ZoneTexte 21">
             <a:extLst>
               <a:ext uri="{FF2B5EF4-FFF2-40B4-BE49-F238E27FC236}">
-                <a16:creationId xmlns:a16="http://schemas.microsoft.com/office/drawing/2014/main" id="{E45D6EB2-134A-4CF7-8A33-FCD07878DC39}"/>
+                <a16:creationId xmlns:a16="http://schemas.microsoft.com/office/drawing/2014/main" id="{0409C305-8E25-7144-A867-6F7324F0C71E}"/>
               </a:ext>
             </a:extLst>
           </p:cNvPr>
@@ -19363,8 +19812,8 @@
         </p:nvSpPr>
         <p:spPr>
           <a:xfrm>
-            <a:off x="6372807" y="3451313"/>
-            <a:ext cx="1201474" cy="246221"/>
+            <a:off x="1658379" y="3498293"/>
+            <a:ext cx="1440000" cy="369332"/>
           </a:xfrm>
           <a:prstGeom prst="rect">
             <a:avLst/>
@@ -19380,13 +19829,1257 @@
           <a:lstStyle/>
           <a:p>
             <a:r>
-              <a:rPr lang="fr-FR" sz="1000" dirty="0">
+              <a:rPr lang="en-US" sz="800" b="1" dirty="0">
                 <a:solidFill>
                   <a:srgbClr val="27509B"/>
                 </a:solidFill>
-                <a:latin typeface="Gotham Rounded Bold" pitchFamily="50" charset="0"/>
+                <a:latin typeface="Michelin SemiBold" panose="02000000000000000000" pitchFamily="2" charset="0"/>
               </a:rPr>
-              <a:t>SCALING</a:t>
+              <a:t>Search &amp; Design</a:t>
+            </a:r>
+          </a:p>
+          <a:p>
+            <a:r>
+              <a:rPr lang="en-US" sz="1000" i="1" dirty="0">
+                <a:solidFill>
+                  <a:schemeClr val="tx1">
+                    <a:lumMod val="65000"/>
+                    <a:lumOff val="35000"/>
+                  </a:schemeClr>
+                </a:solidFill>
+              </a:rPr>
+              <a:t>Explore</a:t>
+            </a:r>
+          </a:p>
+        </p:txBody>
+      </p:sp>
+      <p:sp>
+        <p:nvSpPr>
+          <p:cNvPr id="27" name="ZoneTexte 26">
+            <a:extLst>
+              <a:ext uri="{FF2B5EF4-FFF2-40B4-BE49-F238E27FC236}">
+                <a16:creationId xmlns:a16="http://schemas.microsoft.com/office/drawing/2014/main" id="{B789EA23-0FCE-E544-BFAA-A58C06E8F2BE}"/>
+              </a:ext>
+            </a:extLst>
+          </p:cNvPr>
+          <p:cNvSpPr txBox="1"/>
+          <p:nvPr/>
+        </p:nvSpPr>
+        <p:spPr>
+          <a:xfrm>
+            <a:off x="3482201" y="3498293"/>
+            <a:ext cx="1440000" cy="369332"/>
+          </a:xfrm>
+          <a:prstGeom prst="rect">
+            <a:avLst/>
+          </a:prstGeom>
+          <a:solidFill>
+            <a:schemeClr val="bg1"/>
+          </a:solidFill>
+        </p:spPr>
+        <p:txBody>
+          <a:bodyPr wrap="square" rtlCol="0">
+            <a:spAutoFit/>
+          </a:bodyPr>
+          <a:lstStyle/>
+          <a:p>
+            <a:r>
+              <a:rPr lang="en-US" sz="800" b="1" dirty="0">
+                <a:solidFill>
+                  <a:srgbClr val="27509B"/>
+                </a:solidFill>
+                <a:latin typeface="Michelin SemiBold" panose="02000000000000000000" pitchFamily="2" charset="0"/>
+              </a:rPr>
+              <a:t>Growth</a:t>
+            </a:r>
+          </a:p>
+          <a:p>
+            <a:r>
+              <a:rPr lang="en-US" sz="1000" i="1" dirty="0">
+                <a:solidFill>
+                  <a:schemeClr val="tx1">
+                    <a:lumMod val="65000"/>
+                    <a:lumOff val="35000"/>
+                  </a:schemeClr>
+                </a:solidFill>
+              </a:rPr>
+              <a:t>Exploit</a:t>
+            </a:r>
+          </a:p>
+        </p:txBody>
+      </p:sp>
+      <p:sp>
+        <p:nvSpPr>
+          <p:cNvPr id="28" name="ZoneTexte 27">
+            <a:extLst>
+              <a:ext uri="{FF2B5EF4-FFF2-40B4-BE49-F238E27FC236}">
+                <a16:creationId xmlns:a16="http://schemas.microsoft.com/office/drawing/2014/main" id="{6C428F77-4792-9E4C-813B-6E7D535DF37E}"/>
+              </a:ext>
+            </a:extLst>
+          </p:cNvPr>
+          <p:cNvSpPr txBox="1"/>
+          <p:nvPr/>
+        </p:nvSpPr>
+        <p:spPr>
+          <a:xfrm>
+            <a:off x="5306023" y="3498293"/>
+            <a:ext cx="1440000" cy="369332"/>
+          </a:xfrm>
+          <a:prstGeom prst="rect">
+            <a:avLst/>
+          </a:prstGeom>
+          <a:solidFill>
+            <a:schemeClr val="bg1"/>
+          </a:solidFill>
+        </p:spPr>
+        <p:txBody>
+          <a:bodyPr wrap="square" rtlCol="0">
+            <a:spAutoFit/>
+          </a:bodyPr>
+          <a:lstStyle/>
+          <a:p>
+            <a:r>
+              <a:rPr lang="en-US" sz="800" b="1" dirty="0">
+                <a:solidFill>
+                  <a:srgbClr val="27509B"/>
+                </a:solidFill>
+                <a:latin typeface="Michelin SemiBold" panose="02000000000000000000" pitchFamily="2" charset="0"/>
+              </a:rPr>
+              <a:t>Maturity</a:t>
+            </a:r>
+          </a:p>
+          <a:p>
+            <a:r>
+              <a:rPr lang="en-US" sz="1000" i="1" dirty="0">
+                <a:solidFill>
+                  <a:schemeClr val="tx1">
+                    <a:lumMod val="65000"/>
+                    <a:lumOff val="35000"/>
+                  </a:schemeClr>
+                </a:solidFill>
+              </a:rPr>
+              <a:t>Sustain</a:t>
+            </a:r>
+          </a:p>
+        </p:txBody>
+      </p:sp>
+      <p:sp>
+        <p:nvSpPr>
+          <p:cNvPr id="29" name="ZoneTexte 28">
+            <a:extLst>
+              <a:ext uri="{FF2B5EF4-FFF2-40B4-BE49-F238E27FC236}">
+                <a16:creationId xmlns:a16="http://schemas.microsoft.com/office/drawing/2014/main" id="{5638AF55-126C-D946-A71F-0204634FC9FE}"/>
+              </a:ext>
+            </a:extLst>
+          </p:cNvPr>
+          <p:cNvSpPr txBox="1"/>
+          <p:nvPr/>
+        </p:nvSpPr>
+        <p:spPr>
+          <a:xfrm>
+            <a:off x="7129845" y="3498293"/>
+            <a:ext cx="1440000" cy="369332"/>
+          </a:xfrm>
+          <a:prstGeom prst="rect">
+            <a:avLst/>
+          </a:prstGeom>
+          <a:solidFill>
+            <a:schemeClr val="bg1"/>
+          </a:solidFill>
+        </p:spPr>
+        <p:txBody>
+          <a:bodyPr wrap="square" rtlCol="0">
+            <a:spAutoFit/>
+          </a:bodyPr>
+          <a:lstStyle/>
+          <a:p>
+            <a:r>
+              <a:rPr lang="en-US" sz="800" b="1" dirty="0">
+                <a:solidFill>
+                  <a:srgbClr val="27509B"/>
+                </a:solidFill>
+                <a:latin typeface="Michelin SemiBold" panose="02000000000000000000" pitchFamily="2" charset="0"/>
+              </a:rPr>
+              <a:t>Decline</a:t>
+            </a:r>
+          </a:p>
+          <a:p>
+            <a:r>
+              <a:rPr lang="en-US" sz="1000" i="1" dirty="0">
+                <a:solidFill>
+                  <a:schemeClr val="tx1">
+                    <a:lumMod val="65000"/>
+                    <a:lumOff val="35000"/>
+                  </a:schemeClr>
+                </a:solidFill>
+              </a:rPr>
+              <a:t>Retire</a:t>
+            </a:r>
+          </a:p>
+        </p:txBody>
+      </p:sp>
+      <p:sp>
+        <p:nvSpPr>
+          <p:cNvPr id="24" name="Forme libre 23">
+            <a:extLst>
+              <a:ext uri="{FF2B5EF4-FFF2-40B4-BE49-F238E27FC236}">
+                <a16:creationId xmlns:a16="http://schemas.microsoft.com/office/drawing/2014/main" id="{DEE3D7BF-F431-0847-88BD-5720E76818AF}"/>
+              </a:ext>
+            </a:extLst>
+          </p:cNvPr>
+          <p:cNvSpPr/>
+          <p:nvPr/>
+        </p:nvSpPr>
+        <p:spPr>
+          <a:xfrm>
+            <a:off x="1313296" y="3124616"/>
+            <a:ext cx="7321731" cy="1163917"/>
+          </a:xfrm>
+          <a:custGeom>
+            <a:avLst/>
+            <a:gdLst>
+              <a:gd name="connsiteX0" fmla="*/ 0 w 6348549"/>
+              <a:gd name="connsiteY0" fmla="*/ 1137792 h 1137792"/>
+              <a:gd name="connsiteX1" fmla="*/ 894806 w 6348549"/>
+              <a:gd name="connsiteY1" fmla="*/ 811221 h 1137792"/>
+              <a:gd name="connsiteX2" fmla="*/ 1410789 w 6348549"/>
+              <a:gd name="connsiteY2" fmla="*/ 438929 h 1137792"/>
+              <a:gd name="connsiteX3" fmla="*/ 1867989 w 6348549"/>
+              <a:gd name="connsiteY3" fmla="*/ 112358 h 1137792"/>
+              <a:gd name="connsiteX4" fmla="*/ 2488474 w 6348549"/>
+              <a:gd name="connsiteY4" fmla="*/ 1324 h 1137792"/>
+              <a:gd name="connsiteX5" fmla="*/ 3696789 w 6348549"/>
+              <a:gd name="connsiteY5" fmla="*/ 60107 h 1137792"/>
+              <a:gd name="connsiteX6" fmla="*/ 4545874 w 6348549"/>
+              <a:gd name="connsiteY6" fmla="*/ 190735 h 1137792"/>
+              <a:gd name="connsiteX7" fmla="*/ 4963886 w 6348549"/>
+              <a:gd name="connsiteY7" fmla="*/ 451992 h 1137792"/>
+              <a:gd name="connsiteX8" fmla="*/ 5257800 w 6348549"/>
+              <a:gd name="connsiteY8" fmla="*/ 785095 h 1137792"/>
+              <a:gd name="connsiteX9" fmla="*/ 5492932 w 6348549"/>
+              <a:gd name="connsiteY9" fmla="*/ 961444 h 1137792"/>
+              <a:gd name="connsiteX10" fmla="*/ 6348549 w 6348549"/>
+              <a:gd name="connsiteY10" fmla="*/ 1085541 h 1137792"/>
+              <a:gd name="connsiteX0" fmla="*/ 0 w 6897189"/>
+              <a:gd name="connsiteY0" fmla="*/ 1163917 h 1163917"/>
+              <a:gd name="connsiteX1" fmla="*/ 1443446 w 6897189"/>
+              <a:gd name="connsiteY1" fmla="*/ 811221 h 1163917"/>
+              <a:gd name="connsiteX2" fmla="*/ 1959429 w 6897189"/>
+              <a:gd name="connsiteY2" fmla="*/ 438929 h 1163917"/>
+              <a:gd name="connsiteX3" fmla="*/ 2416629 w 6897189"/>
+              <a:gd name="connsiteY3" fmla="*/ 112358 h 1163917"/>
+              <a:gd name="connsiteX4" fmla="*/ 3037114 w 6897189"/>
+              <a:gd name="connsiteY4" fmla="*/ 1324 h 1163917"/>
+              <a:gd name="connsiteX5" fmla="*/ 4245429 w 6897189"/>
+              <a:gd name="connsiteY5" fmla="*/ 60107 h 1163917"/>
+              <a:gd name="connsiteX6" fmla="*/ 5094514 w 6897189"/>
+              <a:gd name="connsiteY6" fmla="*/ 190735 h 1163917"/>
+              <a:gd name="connsiteX7" fmla="*/ 5512526 w 6897189"/>
+              <a:gd name="connsiteY7" fmla="*/ 451992 h 1163917"/>
+              <a:gd name="connsiteX8" fmla="*/ 5806440 w 6897189"/>
+              <a:gd name="connsiteY8" fmla="*/ 785095 h 1163917"/>
+              <a:gd name="connsiteX9" fmla="*/ 6041572 w 6897189"/>
+              <a:gd name="connsiteY9" fmla="*/ 961444 h 1163917"/>
+              <a:gd name="connsiteX10" fmla="*/ 6897189 w 6897189"/>
+              <a:gd name="connsiteY10" fmla="*/ 1085541 h 1163917"/>
+              <a:gd name="connsiteX0" fmla="*/ 0 w 6897189"/>
+              <a:gd name="connsiteY0" fmla="*/ 1163917 h 1163917"/>
+              <a:gd name="connsiteX1" fmla="*/ 1502229 w 6897189"/>
+              <a:gd name="connsiteY1" fmla="*/ 981038 h 1163917"/>
+              <a:gd name="connsiteX2" fmla="*/ 1959429 w 6897189"/>
+              <a:gd name="connsiteY2" fmla="*/ 438929 h 1163917"/>
+              <a:gd name="connsiteX3" fmla="*/ 2416629 w 6897189"/>
+              <a:gd name="connsiteY3" fmla="*/ 112358 h 1163917"/>
+              <a:gd name="connsiteX4" fmla="*/ 3037114 w 6897189"/>
+              <a:gd name="connsiteY4" fmla="*/ 1324 h 1163917"/>
+              <a:gd name="connsiteX5" fmla="*/ 4245429 w 6897189"/>
+              <a:gd name="connsiteY5" fmla="*/ 60107 h 1163917"/>
+              <a:gd name="connsiteX6" fmla="*/ 5094514 w 6897189"/>
+              <a:gd name="connsiteY6" fmla="*/ 190735 h 1163917"/>
+              <a:gd name="connsiteX7" fmla="*/ 5512526 w 6897189"/>
+              <a:gd name="connsiteY7" fmla="*/ 451992 h 1163917"/>
+              <a:gd name="connsiteX8" fmla="*/ 5806440 w 6897189"/>
+              <a:gd name="connsiteY8" fmla="*/ 785095 h 1163917"/>
+              <a:gd name="connsiteX9" fmla="*/ 6041572 w 6897189"/>
+              <a:gd name="connsiteY9" fmla="*/ 961444 h 1163917"/>
+              <a:gd name="connsiteX10" fmla="*/ 6897189 w 6897189"/>
+              <a:gd name="connsiteY10" fmla="*/ 1085541 h 1163917"/>
+              <a:gd name="connsiteX0" fmla="*/ 0 w 6897189"/>
+              <a:gd name="connsiteY0" fmla="*/ 1163917 h 1163917"/>
+              <a:gd name="connsiteX1" fmla="*/ 519525 w 6897189"/>
+              <a:gd name="connsiteY1" fmla="*/ 1083656 h 1163917"/>
+              <a:gd name="connsiteX2" fmla="*/ 1502229 w 6897189"/>
+              <a:gd name="connsiteY2" fmla="*/ 981038 h 1163917"/>
+              <a:gd name="connsiteX3" fmla="*/ 1959429 w 6897189"/>
+              <a:gd name="connsiteY3" fmla="*/ 438929 h 1163917"/>
+              <a:gd name="connsiteX4" fmla="*/ 2416629 w 6897189"/>
+              <a:gd name="connsiteY4" fmla="*/ 112358 h 1163917"/>
+              <a:gd name="connsiteX5" fmla="*/ 3037114 w 6897189"/>
+              <a:gd name="connsiteY5" fmla="*/ 1324 h 1163917"/>
+              <a:gd name="connsiteX6" fmla="*/ 4245429 w 6897189"/>
+              <a:gd name="connsiteY6" fmla="*/ 60107 h 1163917"/>
+              <a:gd name="connsiteX7" fmla="*/ 5094514 w 6897189"/>
+              <a:gd name="connsiteY7" fmla="*/ 190735 h 1163917"/>
+              <a:gd name="connsiteX8" fmla="*/ 5512526 w 6897189"/>
+              <a:gd name="connsiteY8" fmla="*/ 451992 h 1163917"/>
+              <a:gd name="connsiteX9" fmla="*/ 5806440 w 6897189"/>
+              <a:gd name="connsiteY9" fmla="*/ 785095 h 1163917"/>
+              <a:gd name="connsiteX10" fmla="*/ 6041572 w 6897189"/>
+              <a:gd name="connsiteY10" fmla="*/ 961444 h 1163917"/>
+              <a:gd name="connsiteX11" fmla="*/ 6897189 w 6897189"/>
+              <a:gd name="connsiteY11" fmla="*/ 1085541 h 1163917"/>
+              <a:gd name="connsiteX0" fmla="*/ 0 w 6897189"/>
+              <a:gd name="connsiteY0" fmla="*/ 1163917 h 1163917"/>
+              <a:gd name="connsiteX1" fmla="*/ 532588 w 6897189"/>
+              <a:gd name="connsiteY1" fmla="*/ 1142438 h 1163917"/>
+              <a:gd name="connsiteX2" fmla="*/ 1502229 w 6897189"/>
+              <a:gd name="connsiteY2" fmla="*/ 981038 h 1163917"/>
+              <a:gd name="connsiteX3" fmla="*/ 1959429 w 6897189"/>
+              <a:gd name="connsiteY3" fmla="*/ 438929 h 1163917"/>
+              <a:gd name="connsiteX4" fmla="*/ 2416629 w 6897189"/>
+              <a:gd name="connsiteY4" fmla="*/ 112358 h 1163917"/>
+              <a:gd name="connsiteX5" fmla="*/ 3037114 w 6897189"/>
+              <a:gd name="connsiteY5" fmla="*/ 1324 h 1163917"/>
+              <a:gd name="connsiteX6" fmla="*/ 4245429 w 6897189"/>
+              <a:gd name="connsiteY6" fmla="*/ 60107 h 1163917"/>
+              <a:gd name="connsiteX7" fmla="*/ 5094514 w 6897189"/>
+              <a:gd name="connsiteY7" fmla="*/ 190735 h 1163917"/>
+              <a:gd name="connsiteX8" fmla="*/ 5512526 w 6897189"/>
+              <a:gd name="connsiteY8" fmla="*/ 451992 h 1163917"/>
+              <a:gd name="connsiteX9" fmla="*/ 5806440 w 6897189"/>
+              <a:gd name="connsiteY9" fmla="*/ 785095 h 1163917"/>
+              <a:gd name="connsiteX10" fmla="*/ 6041572 w 6897189"/>
+              <a:gd name="connsiteY10" fmla="*/ 961444 h 1163917"/>
+              <a:gd name="connsiteX11" fmla="*/ 6897189 w 6897189"/>
+              <a:gd name="connsiteY11" fmla="*/ 1085541 h 1163917"/>
+              <a:gd name="connsiteX0" fmla="*/ 0 w 6897189"/>
+              <a:gd name="connsiteY0" fmla="*/ 1163917 h 1163917"/>
+              <a:gd name="connsiteX1" fmla="*/ 532588 w 6897189"/>
+              <a:gd name="connsiteY1" fmla="*/ 1142438 h 1163917"/>
+              <a:gd name="connsiteX2" fmla="*/ 917942 w 6897189"/>
+              <a:gd name="connsiteY2" fmla="*/ 1103250 h 1163917"/>
+              <a:gd name="connsiteX3" fmla="*/ 1502229 w 6897189"/>
+              <a:gd name="connsiteY3" fmla="*/ 981038 h 1163917"/>
+              <a:gd name="connsiteX4" fmla="*/ 1959429 w 6897189"/>
+              <a:gd name="connsiteY4" fmla="*/ 438929 h 1163917"/>
+              <a:gd name="connsiteX5" fmla="*/ 2416629 w 6897189"/>
+              <a:gd name="connsiteY5" fmla="*/ 112358 h 1163917"/>
+              <a:gd name="connsiteX6" fmla="*/ 3037114 w 6897189"/>
+              <a:gd name="connsiteY6" fmla="*/ 1324 h 1163917"/>
+              <a:gd name="connsiteX7" fmla="*/ 4245429 w 6897189"/>
+              <a:gd name="connsiteY7" fmla="*/ 60107 h 1163917"/>
+              <a:gd name="connsiteX8" fmla="*/ 5094514 w 6897189"/>
+              <a:gd name="connsiteY8" fmla="*/ 190735 h 1163917"/>
+              <a:gd name="connsiteX9" fmla="*/ 5512526 w 6897189"/>
+              <a:gd name="connsiteY9" fmla="*/ 451992 h 1163917"/>
+              <a:gd name="connsiteX10" fmla="*/ 5806440 w 6897189"/>
+              <a:gd name="connsiteY10" fmla="*/ 785095 h 1163917"/>
+              <a:gd name="connsiteX11" fmla="*/ 6041572 w 6897189"/>
+              <a:gd name="connsiteY11" fmla="*/ 961444 h 1163917"/>
+              <a:gd name="connsiteX12" fmla="*/ 6897189 w 6897189"/>
+              <a:gd name="connsiteY12" fmla="*/ 1085541 h 1163917"/>
+              <a:gd name="connsiteX0" fmla="*/ 0 w 6897189"/>
+              <a:gd name="connsiteY0" fmla="*/ 1163917 h 1184435"/>
+              <a:gd name="connsiteX1" fmla="*/ 558714 w 6897189"/>
+              <a:gd name="connsiteY1" fmla="*/ 1175095 h 1184435"/>
+              <a:gd name="connsiteX2" fmla="*/ 917942 w 6897189"/>
+              <a:gd name="connsiteY2" fmla="*/ 1103250 h 1184435"/>
+              <a:gd name="connsiteX3" fmla="*/ 1502229 w 6897189"/>
+              <a:gd name="connsiteY3" fmla="*/ 981038 h 1184435"/>
+              <a:gd name="connsiteX4" fmla="*/ 1959429 w 6897189"/>
+              <a:gd name="connsiteY4" fmla="*/ 438929 h 1184435"/>
+              <a:gd name="connsiteX5" fmla="*/ 2416629 w 6897189"/>
+              <a:gd name="connsiteY5" fmla="*/ 112358 h 1184435"/>
+              <a:gd name="connsiteX6" fmla="*/ 3037114 w 6897189"/>
+              <a:gd name="connsiteY6" fmla="*/ 1324 h 1184435"/>
+              <a:gd name="connsiteX7" fmla="*/ 4245429 w 6897189"/>
+              <a:gd name="connsiteY7" fmla="*/ 60107 h 1184435"/>
+              <a:gd name="connsiteX8" fmla="*/ 5094514 w 6897189"/>
+              <a:gd name="connsiteY8" fmla="*/ 190735 h 1184435"/>
+              <a:gd name="connsiteX9" fmla="*/ 5512526 w 6897189"/>
+              <a:gd name="connsiteY9" fmla="*/ 451992 h 1184435"/>
+              <a:gd name="connsiteX10" fmla="*/ 5806440 w 6897189"/>
+              <a:gd name="connsiteY10" fmla="*/ 785095 h 1184435"/>
+              <a:gd name="connsiteX11" fmla="*/ 6041572 w 6897189"/>
+              <a:gd name="connsiteY11" fmla="*/ 961444 h 1184435"/>
+              <a:gd name="connsiteX12" fmla="*/ 6897189 w 6897189"/>
+              <a:gd name="connsiteY12" fmla="*/ 1085541 h 1184435"/>
+              <a:gd name="connsiteX0" fmla="*/ 0 w 6897189"/>
+              <a:gd name="connsiteY0" fmla="*/ 1163917 h 1163917"/>
+              <a:gd name="connsiteX1" fmla="*/ 545652 w 6897189"/>
+              <a:gd name="connsiteY1" fmla="*/ 1148969 h 1163917"/>
+              <a:gd name="connsiteX2" fmla="*/ 917942 w 6897189"/>
+              <a:gd name="connsiteY2" fmla="*/ 1103250 h 1163917"/>
+              <a:gd name="connsiteX3" fmla="*/ 1502229 w 6897189"/>
+              <a:gd name="connsiteY3" fmla="*/ 981038 h 1163917"/>
+              <a:gd name="connsiteX4" fmla="*/ 1959429 w 6897189"/>
+              <a:gd name="connsiteY4" fmla="*/ 438929 h 1163917"/>
+              <a:gd name="connsiteX5" fmla="*/ 2416629 w 6897189"/>
+              <a:gd name="connsiteY5" fmla="*/ 112358 h 1163917"/>
+              <a:gd name="connsiteX6" fmla="*/ 3037114 w 6897189"/>
+              <a:gd name="connsiteY6" fmla="*/ 1324 h 1163917"/>
+              <a:gd name="connsiteX7" fmla="*/ 4245429 w 6897189"/>
+              <a:gd name="connsiteY7" fmla="*/ 60107 h 1163917"/>
+              <a:gd name="connsiteX8" fmla="*/ 5094514 w 6897189"/>
+              <a:gd name="connsiteY8" fmla="*/ 190735 h 1163917"/>
+              <a:gd name="connsiteX9" fmla="*/ 5512526 w 6897189"/>
+              <a:gd name="connsiteY9" fmla="*/ 451992 h 1163917"/>
+              <a:gd name="connsiteX10" fmla="*/ 5806440 w 6897189"/>
+              <a:gd name="connsiteY10" fmla="*/ 785095 h 1163917"/>
+              <a:gd name="connsiteX11" fmla="*/ 6041572 w 6897189"/>
+              <a:gd name="connsiteY11" fmla="*/ 961444 h 1163917"/>
+              <a:gd name="connsiteX12" fmla="*/ 6897189 w 6897189"/>
+              <a:gd name="connsiteY12" fmla="*/ 1085541 h 1163917"/>
+              <a:gd name="connsiteX0" fmla="*/ 0 w 6897189"/>
+              <a:gd name="connsiteY0" fmla="*/ 1163917 h 1163917"/>
+              <a:gd name="connsiteX1" fmla="*/ 545652 w 6897189"/>
+              <a:gd name="connsiteY1" fmla="*/ 1148969 h 1163917"/>
+              <a:gd name="connsiteX2" fmla="*/ 970194 w 6897189"/>
+              <a:gd name="connsiteY2" fmla="*/ 1122844 h 1163917"/>
+              <a:gd name="connsiteX3" fmla="*/ 1502229 w 6897189"/>
+              <a:gd name="connsiteY3" fmla="*/ 981038 h 1163917"/>
+              <a:gd name="connsiteX4" fmla="*/ 1959429 w 6897189"/>
+              <a:gd name="connsiteY4" fmla="*/ 438929 h 1163917"/>
+              <a:gd name="connsiteX5" fmla="*/ 2416629 w 6897189"/>
+              <a:gd name="connsiteY5" fmla="*/ 112358 h 1163917"/>
+              <a:gd name="connsiteX6" fmla="*/ 3037114 w 6897189"/>
+              <a:gd name="connsiteY6" fmla="*/ 1324 h 1163917"/>
+              <a:gd name="connsiteX7" fmla="*/ 4245429 w 6897189"/>
+              <a:gd name="connsiteY7" fmla="*/ 60107 h 1163917"/>
+              <a:gd name="connsiteX8" fmla="*/ 5094514 w 6897189"/>
+              <a:gd name="connsiteY8" fmla="*/ 190735 h 1163917"/>
+              <a:gd name="connsiteX9" fmla="*/ 5512526 w 6897189"/>
+              <a:gd name="connsiteY9" fmla="*/ 451992 h 1163917"/>
+              <a:gd name="connsiteX10" fmla="*/ 5806440 w 6897189"/>
+              <a:gd name="connsiteY10" fmla="*/ 785095 h 1163917"/>
+              <a:gd name="connsiteX11" fmla="*/ 6041572 w 6897189"/>
+              <a:gd name="connsiteY11" fmla="*/ 961444 h 1163917"/>
+              <a:gd name="connsiteX12" fmla="*/ 6897189 w 6897189"/>
+              <a:gd name="connsiteY12" fmla="*/ 1085541 h 1163917"/>
+              <a:gd name="connsiteX0" fmla="*/ 0 w 6897189"/>
+              <a:gd name="connsiteY0" fmla="*/ 1163917 h 1163917"/>
+              <a:gd name="connsiteX1" fmla="*/ 545652 w 6897189"/>
+              <a:gd name="connsiteY1" fmla="*/ 1148969 h 1163917"/>
+              <a:gd name="connsiteX2" fmla="*/ 970194 w 6897189"/>
+              <a:gd name="connsiteY2" fmla="*/ 1122844 h 1163917"/>
+              <a:gd name="connsiteX3" fmla="*/ 1528354 w 6897189"/>
+              <a:gd name="connsiteY3" fmla="*/ 896129 h 1163917"/>
+              <a:gd name="connsiteX4" fmla="*/ 1959429 w 6897189"/>
+              <a:gd name="connsiteY4" fmla="*/ 438929 h 1163917"/>
+              <a:gd name="connsiteX5" fmla="*/ 2416629 w 6897189"/>
+              <a:gd name="connsiteY5" fmla="*/ 112358 h 1163917"/>
+              <a:gd name="connsiteX6" fmla="*/ 3037114 w 6897189"/>
+              <a:gd name="connsiteY6" fmla="*/ 1324 h 1163917"/>
+              <a:gd name="connsiteX7" fmla="*/ 4245429 w 6897189"/>
+              <a:gd name="connsiteY7" fmla="*/ 60107 h 1163917"/>
+              <a:gd name="connsiteX8" fmla="*/ 5094514 w 6897189"/>
+              <a:gd name="connsiteY8" fmla="*/ 190735 h 1163917"/>
+              <a:gd name="connsiteX9" fmla="*/ 5512526 w 6897189"/>
+              <a:gd name="connsiteY9" fmla="*/ 451992 h 1163917"/>
+              <a:gd name="connsiteX10" fmla="*/ 5806440 w 6897189"/>
+              <a:gd name="connsiteY10" fmla="*/ 785095 h 1163917"/>
+              <a:gd name="connsiteX11" fmla="*/ 6041572 w 6897189"/>
+              <a:gd name="connsiteY11" fmla="*/ 961444 h 1163917"/>
+              <a:gd name="connsiteX12" fmla="*/ 6897189 w 6897189"/>
+              <a:gd name="connsiteY12" fmla="*/ 1085541 h 1163917"/>
+              <a:gd name="connsiteX0" fmla="*/ 0 w 6897189"/>
+              <a:gd name="connsiteY0" fmla="*/ 1163917 h 1163917"/>
+              <a:gd name="connsiteX1" fmla="*/ 545652 w 6897189"/>
+              <a:gd name="connsiteY1" fmla="*/ 1148969 h 1163917"/>
+              <a:gd name="connsiteX2" fmla="*/ 970194 w 6897189"/>
+              <a:gd name="connsiteY2" fmla="*/ 1122844 h 1163917"/>
+              <a:gd name="connsiteX3" fmla="*/ 1528354 w 6897189"/>
+              <a:gd name="connsiteY3" fmla="*/ 896129 h 1163917"/>
+              <a:gd name="connsiteX4" fmla="*/ 1959429 w 6897189"/>
+              <a:gd name="connsiteY4" fmla="*/ 438929 h 1163917"/>
+              <a:gd name="connsiteX5" fmla="*/ 2416629 w 6897189"/>
+              <a:gd name="connsiteY5" fmla="*/ 112358 h 1163917"/>
+              <a:gd name="connsiteX6" fmla="*/ 3037114 w 6897189"/>
+              <a:gd name="connsiteY6" fmla="*/ 1324 h 1163917"/>
+              <a:gd name="connsiteX7" fmla="*/ 4245429 w 6897189"/>
+              <a:gd name="connsiteY7" fmla="*/ 60107 h 1163917"/>
+              <a:gd name="connsiteX8" fmla="*/ 5094514 w 6897189"/>
+              <a:gd name="connsiteY8" fmla="*/ 190735 h 1163917"/>
+              <a:gd name="connsiteX9" fmla="*/ 5512526 w 6897189"/>
+              <a:gd name="connsiteY9" fmla="*/ 451992 h 1163917"/>
+              <a:gd name="connsiteX10" fmla="*/ 5806440 w 6897189"/>
+              <a:gd name="connsiteY10" fmla="*/ 785095 h 1163917"/>
+              <a:gd name="connsiteX11" fmla="*/ 6126481 w 6897189"/>
+              <a:gd name="connsiteY11" fmla="*/ 954913 h 1163917"/>
+              <a:gd name="connsiteX12" fmla="*/ 6897189 w 6897189"/>
+              <a:gd name="connsiteY12" fmla="*/ 1085541 h 1163917"/>
+              <a:gd name="connsiteX0" fmla="*/ 0 w 7648303"/>
+              <a:gd name="connsiteY0" fmla="*/ 1163917 h 1163917"/>
+              <a:gd name="connsiteX1" fmla="*/ 545652 w 7648303"/>
+              <a:gd name="connsiteY1" fmla="*/ 1148969 h 1163917"/>
+              <a:gd name="connsiteX2" fmla="*/ 970194 w 7648303"/>
+              <a:gd name="connsiteY2" fmla="*/ 1122844 h 1163917"/>
+              <a:gd name="connsiteX3" fmla="*/ 1528354 w 7648303"/>
+              <a:gd name="connsiteY3" fmla="*/ 896129 h 1163917"/>
+              <a:gd name="connsiteX4" fmla="*/ 1959429 w 7648303"/>
+              <a:gd name="connsiteY4" fmla="*/ 438929 h 1163917"/>
+              <a:gd name="connsiteX5" fmla="*/ 2416629 w 7648303"/>
+              <a:gd name="connsiteY5" fmla="*/ 112358 h 1163917"/>
+              <a:gd name="connsiteX6" fmla="*/ 3037114 w 7648303"/>
+              <a:gd name="connsiteY6" fmla="*/ 1324 h 1163917"/>
+              <a:gd name="connsiteX7" fmla="*/ 4245429 w 7648303"/>
+              <a:gd name="connsiteY7" fmla="*/ 60107 h 1163917"/>
+              <a:gd name="connsiteX8" fmla="*/ 5094514 w 7648303"/>
+              <a:gd name="connsiteY8" fmla="*/ 190735 h 1163917"/>
+              <a:gd name="connsiteX9" fmla="*/ 5512526 w 7648303"/>
+              <a:gd name="connsiteY9" fmla="*/ 451992 h 1163917"/>
+              <a:gd name="connsiteX10" fmla="*/ 5806440 w 7648303"/>
+              <a:gd name="connsiteY10" fmla="*/ 785095 h 1163917"/>
+              <a:gd name="connsiteX11" fmla="*/ 6126481 w 7648303"/>
+              <a:gd name="connsiteY11" fmla="*/ 954913 h 1163917"/>
+              <a:gd name="connsiteX12" fmla="*/ 7648303 w 7648303"/>
+              <a:gd name="connsiteY12" fmla="*/ 1092072 h 1163917"/>
+              <a:gd name="connsiteX0" fmla="*/ 0 w 7648303"/>
+              <a:gd name="connsiteY0" fmla="*/ 1163917 h 1163917"/>
+              <a:gd name="connsiteX1" fmla="*/ 545652 w 7648303"/>
+              <a:gd name="connsiteY1" fmla="*/ 1148969 h 1163917"/>
+              <a:gd name="connsiteX2" fmla="*/ 970194 w 7648303"/>
+              <a:gd name="connsiteY2" fmla="*/ 1122844 h 1163917"/>
+              <a:gd name="connsiteX3" fmla="*/ 1528354 w 7648303"/>
+              <a:gd name="connsiteY3" fmla="*/ 896129 h 1163917"/>
+              <a:gd name="connsiteX4" fmla="*/ 1959429 w 7648303"/>
+              <a:gd name="connsiteY4" fmla="*/ 438929 h 1163917"/>
+              <a:gd name="connsiteX5" fmla="*/ 2416629 w 7648303"/>
+              <a:gd name="connsiteY5" fmla="*/ 112358 h 1163917"/>
+              <a:gd name="connsiteX6" fmla="*/ 3037114 w 7648303"/>
+              <a:gd name="connsiteY6" fmla="*/ 1324 h 1163917"/>
+              <a:gd name="connsiteX7" fmla="*/ 4245429 w 7648303"/>
+              <a:gd name="connsiteY7" fmla="*/ 60107 h 1163917"/>
+              <a:gd name="connsiteX8" fmla="*/ 5094514 w 7648303"/>
+              <a:gd name="connsiteY8" fmla="*/ 190735 h 1163917"/>
+              <a:gd name="connsiteX9" fmla="*/ 5512526 w 7648303"/>
+              <a:gd name="connsiteY9" fmla="*/ 451992 h 1163917"/>
+              <a:gd name="connsiteX10" fmla="*/ 5806440 w 7648303"/>
+              <a:gd name="connsiteY10" fmla="*/ 785095 h 1163917"/>
+              <a:gd name="connsiteX11" fmla="*/ 6126481 w 7648303"/>
+              <a:gd name="connsiteY11" fmla="*/ 954913 h 1163917"/>
+              <a:gd name="connsiteX12" fmla="*/ 6802760 w 7648303"/>
+              <a:gd name="connsiteY12" fmla="*/ 1024873 h 1163917"/>
+              <a:gd name="connsiteX13" fmla="*/ 7648303 w 7648303"/>
+              <a:gd name="connsiteY13" fmla="*/ 1092072 h 1163917"/>
+              <a:gd name="connsiteX0" fmla="*/ 0 w 7648303"/>
+              <a:gd name="connsiteY0" fmla="*/ 1163917 h 1163917"/>
+              <a:gd name="connsiteX1" fmla="*/ 545652 w 7648303"/>
+              <a:gd name="connsiteY1" fmla="*/ 1148969 h 1163917"/>
+              <a:gd name="connsiteX2" fmla="*/ 970194 w 7648303"/>
+              <a:gd name="connsiteY2" fmla="*/ 1122844 h 1163917"/>
+              <a:gd name="connsiteX3" fmla="*/ 1528354 w 7648303"/>
+              <a:gd name="connsiteY3" fmla="*/ 896129 h 1163917"/>
+              <a:gd name="connsiteX4" fmla="*/ 1959429 w 7648303"/>
+              <a:gd name="connsiteY4" fmla="*/ 438929 h 1163917"/>
+              <a:gd name="connsiteX5" fmla="*/ 2416629 w 7648303"/>
+              <a:gd name="connsiteY5" fmla="*/ 112358 h 1163917"/>
+              <a:gd name="connsiteX6" fmla="*/ 3037114 w 7648303"/>
+              <a:gd name="connsiteY6" fmla="*/ 1324 h 1163917"/>
+              <a:gd name="connsiteX7" fmla="*/ 4245429 w 7648303"/>
+              <a:gd name="connsiteY7" fmla="*/ 60107 h 1163917"/>
+              <a:gd name="connsiteX8" fmla="*/ 5094514 w 7648303"/>
+              <a:gd name="connsiteY8" fmla="*/ 190735 h 1163917"/>
+              <a:gd name="connsiteX9" fmla="*/ 5512526 w 7648303"/>
+              <a:gd name="connsiteY9" fmla="*/ 451992 h 1163917"/>
+              <a:gd name="connsiteX10" fmla="*/ 5806440 w 7648303"/>
+              <a:gd name="connsiteY10" fmla="*/ 785095 h 1163917"/>
+              <a:gd name="connsiteX11" fmla="*/ 6126481 w 7648303"/>
+              <a:gd name="connsiteY11" fmla="*/ 954913 h 1163917"/>
+              <a:gd name="connsiteX12" fmla="*/ 6952983 w 7648303"/>
+              <a:gd name="connsiteY12" fmla="*/ 1057530 h 1163917"/>
+              <a:gd name="connsiteX13" fmla="*/ 7648303 w 7648303"/>
+              <a:gd name="connsiteY13" fmla="*/ 1092072 h 1163917"/>
+              <a:gd name="connsiteX0" fmla="*/ 0 w 7321731"/>
+              <a:gd name="connsiteY0" fmla="*/ 1163917 h 1163917"/>
+              <a:gd name="connsiteX1" fmla="*/ 545652 w 7321731"/>
+              <a:gd name="connsiteY1" fmla="*/ 1148969 h 1163917"/>
+              <a:gd name="connsiteX2" fmla="*/ 970194 w 7321731"/>
+              <a:gd name="connsiteY2" fmla="*/ 1122844 h 1163917"/>
+              <a:gd name="connsiteX3" fmla="*/ 1528354 w 7321731"/>
+              <a:gd name="connsiteY3" fmla="*/ 896129 h 1163917"/>
+              <a:gd name="connsiteX4" fmla="*/ 1959429 w 7321731"/>
+              <a:gd name="connsiteY4" fmla="*/ 438929 h 1163917"/>
+              <a:gd name="connsiteX5" fmla="*/ 2416629 w 7321731"/>
+              <a:gd name="connsiteY5" fmla="*/ 112358 h 1163917"/>
+              <a:gd name="connsiteX6" fmla="*/ 3037114 w 7321731"/>
+              <a:gd name="connsiteY6" fmla="*/ 1324 h 1163917"/>
+              <a:gd name="connsiteX7" fmla="*/ 4245429 w 7321731"/>
+              <a:gd name="connsiteY7" fmla="*/ 60107 h 1163917"/>
+              <a:gd name="connsiteX8" fmla="*/ 5094514 w 7321731"/>
+              <a:gd name="connsiteY8" fmla="*/ 190735 h 1163917"/>
+              <a:gd name="connsiteX9" fmla="*/ 5512526 w 7321731"/>
+              <a:gd name="connsiteY9" fmla="*/ 451992 h 1163917"/>
+              <a:gd name="connsiteX10" fmla="*/ 5806440 w 7321731"/>
+              <a:gd name="connsiteY10" fmla="*/ 785095 h 1163917"/>
+              <a:gd name="connsiteX11" fmla="*/ 6126481 w 7321731"/>
+              <a:gd name="connsiteY11" fmla="*/ 954913 h 1163917"/>
+              <a:gd name="connsiteX12" fmla="*/ 6952983 w 7321731"/>
+              <a:gd name="connsiteY12" fmla="*/ 1057530 h 1163917"/>
+              <a:gd name="connsiteX13" fmla="*/ 7321731 w 7321731"/>
+              <a:gd name="connsiteY13" fmla="*/ 1085541 h 1163917"/>
+              <a:gd name="connsiteX0" fmla="*/ 0 w 7321731"/>
+              <a:gd name="connsiteY0" fmla="*/ 1163917 h 1163917"/>
+              <a:gd name="connsiteX1" fmla="*/ 545652 w 7321731"/>
+              <a:gd name="connsiteY1" fmla="*/ 1148969 h 1163917"/>
+              <a:gd name="connsiteX2" fmla="*/ 970194 w 7321731"/>
+              <a:gd name="connsiteY2" fmla="*/ 1122844 h 1163917"/>
+              <a:gd name="connsiteX3" fmla="*/ 1528354 w 7321731"/>
+              <a:gd name="connsiteY3" fmla="*/ 896129 h 1163917"/>
+              <a:gd name="connsiteX4" fmla="*/ 1959429 w 7321731"/>
+              <a:gd name="connsiteY4" fmla="*/ 438929 h 1163917"/>
+              <a:gd name="connsiteX5" fmla="*/ 2416629 w 7321731"/>
+              <a:gd name="connsiteY5" fmla="*/ 112358 h 1163917"/>
+              <a:gd name="connsiteX6" fmla="*/ 3037114 w 7321731"/>
+              <a:gd name="connsiteY6" fmla="*/ 1324 h 1163917"/>
+              <a:gd name="connsiteX7" fmla="*/ 4245429 w 7321731"/>
+              <a:gd name="connsiteY7" fmla="*/ 60107 h 1163917"/>
+              <a:gd name="connsiteX8" fmla="*/ 5094514 w 7321731"/>
+              <a:gd name="connsiteY8" fmla="*/ 190735 h 1163917"/>
+              <a:gd name="connsiteX9" fmla="*/ 5512526 w 7321731"/>
+              <a:gd name="connsiteY9" fmla="*/ 451992 h 1163917"/>
+              <a:gd name="connsiteX10" fmla="*/ 5806440 w 7321731"/>
+              <a:gd name="connsiteY10" fmla="*/ 785095 h 1163917"/>
+              <a:gd name="connsiteX11" fmla="*/ 6126481 w 7321731"/>
+              <a:gd name="connsiteY11" fmla="*/ 954913 h 1163917"/>
+              <a:gd name="connsiteX12" fmla="*/ 6848480 w 7321731"/>
+              <a:gd name="connsiteY12" fmla="*/ 1057530 h 1163917"/>
+              <a:gd name="connsiteX13" fmla="*/ 7321731 w 7321731"/>
+              <a:gd name="connsiteY13" fmla="*/ 1085541 h 1163917"/>
+            </a:gdLst>
+            <a:ahLst/>
+            <a:cxnLst>
+              <a:cxn ang="0">
+                <a:pos x="connsiteX0" y="connsiteY0"/>
+              </a:cxn>
+              <a:cxn ang="0">
+                <a:pos x="connsiteX1" y="connsiteY1"/>
+              </a:cxn>
+              <a:cxn ang="0">
+                <a:pos x="connsiteX2" y="connsiteY2"/>
+              </a:cxn>
+              <a:cxn ang="0">
+                <a:pos x="connsiteX3" y="connsiteY3"/>
+              </a:cxn>
+              <a:cxn ang="0">
+                <a:pos x="connsiteX4" y="connsiteY4"/>
+              </a:cxn>
+              <a:cxn ang="0">
+                <a:pos x="connsiteX5" y="connsiteY5"/>
+              </a:cxn>
+              <a:cxn ang="0">
+                <a:pos x="connsiteX6" y="connsiteY6"/>
+              </a:cxn>
+              <a:cxn ang="0">
+                <a:pos x="connsiteX7" y="connsiteY7"/>
+              </a:cxn>
+              <a:cxn ang="0">
+                <a:pos x="connsiteX8" y="connsiteY8"/>
+              </a:cxn>
+              <a:cxn ang="0">
+                <a:pos x="connsiteX9" y="connsiteY9"/>
+              </a:cxn>
+              <a:cxn ang="0">
+                <a:pos x="connsiteX10" y="connsiteY10"/>
+              </a:cxn>
+              <a:cxn ang="0">
+                <a:pos x="connsiteX11" y="connsiteY11"/>
+              </a:cxn>
+              <a:cxn ang="0">
+                <a:pos x="connsiteX12" y="connsiteY12"/>
+              </a:cxn>
+              <a:cxn ang="0">
+                <a:pos x="connsiteX13" y="connsiteY13"/>
+              </a:cxn>
+            </a:cxnLst>
+            <a:rect l="l" t="t" r="r" b="b"/>
+            <a:pathLst>
+              <a:path w="7321731" h="1163917">
+                <a:moveTo>
+                  <a:pt x="0" y="1163917"/>
+                </a:moveTo>
+                <a:cubicBezTo>
+                  <a:pt x="86587" y="1150540"/>
+                  <a:pt x="295281" y="1179449"/>
+                  <a:pt x="545652" y="1148969"/>
+                </a:cubicBezTo>
+                <a:cubicBezTo>
+                  <a:pt x="698642" y="1138858"/>
+                  <a:pt x="808587" y="1149744"/>
+                  <a:pt x="970194" y="1122844"/>
+                </a:cubicBezTo>
+                <a:cubicBezTo>
+                  <a:pt x="1131801" y="1095944"/>
+                  <a:pt x="1363482" y="1010115"/>
+                  <a:pt x="1528354" y="896129"/>
+                </a:cubicBezTo>
+                <a:cubicBezTo>
+                  <a:pt x="1693226" y="782143"/>
+                  <a:pt x="1811383" y="569557"/>
+                  <a:pt x="1959429" y="438929"/>
+                </a:cubicBezTo>
+                <a:cubicBezTo>
+                  <a:pt x="2107475" y="308301"/>
+                  <a:pt x="2237015" y="185292"/>
+                  <a:pt x="2416629" y="112358"/>
+                </a:cubicBezTo>
+                <a:cubicBezTo>
+                  <a:pt x="2596243" y="39424"/>
+                  <a:pt x="2732314" y="10032"/>
+                  <a:pt x="3037114" y="1324"/>
+                </a:cubicBezTo>
+                <a:cubicBezTo>
+                  <a:pt x="3341914" y="-7385"/>
+                  <a:pt x="3902529" y="28539"/>
+                  <a:pt x="4245429" y="60107"/>
+                </a:cubicBezTo>
+                <a:cubicBezTo>
+                  <a:pt x="4588329" y="91675"/>
+                  <a:pt x="4883331" y="125421"/>
+                  <a:pt x="5094514" y="190735"/>
+                </a:cubicBezTo>
+                <a:cubicBezTo>
+                  <a:pt x="5305697" y="256049"/>
+                  <a:pt x="5393872" y="352932"/>
+                  <a:pt x="5512526" y="451992"/>
+                </a:cubicBezTo>
+                <a:cubicBezTo>
+                  <a:pt x="5631180" y="551052"/>
+                  <a:pt x="5704114" y="701275"/>
+                  <a:pt x="5806440" y="785095"/>
+                </a:cubicBezTo>
+                <a:cubicBezTo>
+                  <a:pt x="5908766" y="868915"/>
+                  <a:pt x="5960428" y="914950"/>
+                  <a:pt x="6126481" y="954913"/>
+                </a:cubicBezTo>
+                <a:cubicBezTo>
+                  <a:pt x="6292534" y="994876"/>
+                  <a:pt x="6594843" y="1034670"/>
+                  <a:pt x="6848480" y="1057530"/>
+                </a:cubicBezTo>
+                <a:cubicBezTo>
+                  <a:pt x="7102117" y="1080390"/>
+                  <a:pt x="7180807" y="1074341"/>
+                  <a:pt x="7321731" y="1085541"/>
+                </a:cubicBezTo>
+              </a:path>
+            </a:pathLst>
+          </a:custGeom>
+          <a:noFill/>
+          <a:ln w="12700">
+            <a:solidFill>
+              <a:srgbClr val="27509B"/>
+            </a:solidFill>
+            <a:extLst>
+              <a:ext uri="{C807C97D-BFC1-408E-A445-0C87EB9F89A2}">
+                <ask:lineSketchStyleProps xmlns:ask="http://schemas.microsoft.com/office/drawing/2018/sketchyshapes" sd="1219033472">
+                  <a:custGeom>
+                    <a:avLst/>
+                    <a:gdLst>
+                      <a:gd name="connsiteX0" fmla="*/ 0 w 7648303"/>
+                      <a:gd name="connsiteY0" fmla="*/ 1163917 h 1163917"/>
+                      <a:gd name="connsiteX1" fmla="*/ 545652 w 7648303"/>
+                      <a:gd name="connsiteY1" fmla="*/ 1148969 h 1163917"/>
+                      <a:gd name="connsiteX2" fmla="*/ 970194 w 7648303"/>
+                      <a:gd name="connsiteY2" fmla="*/ 1122844 h 1163917"/>
+                      <a:gd name="connsiteX3" fmla="*/ 1528354 w 7648303"/>
+                      <a:gd name="connsiteY3" fmla="*/ 896129 h 1163917"/>
+                      <a:gd name="connsiteX4" fmla="*/ 1959429 w 7648303"/>
+                      <a:gd name="connsiteY4" fmla="*/ 438929 h 1163917"/>
+                      <a:gd name="connsiteX5" fmla="*/ 2416629 w 7648303"/>
+                      <a:gd name="connsiteY5" fmla="*/ 112358 h 1163917"/>
+                      <a:gd name="connsiteX6" fmla="*/ 3037114 w 7648303"/>
+                      <a:gd name="connsiteY6" fmla="*/ 1324 h 1163917"/>
+                      <a:gd name="connsiteX7" fmla="*/ 4245429 w 7648303"/>
+                      <a:gd name="connsiteY7" fmla="*/ 60107 h 1163917"/>
+                      <a:gd name="connsiteX8" fmla="*/ 5094514 w 7648303"/>
+                      <a:gd name="connsiteY8" fmla="*/ 190735 h 1163917"/>
+                      <a:gd name="connsiteX9" fmla="*/ 5512526 w 7648303"/>
+                      <a:gd name="connsiteY9" fmla="*/ 451992 h 1163917"/>
+                      <a:gd name="connsiteX10" fmla="*/ 5806440 w 7648303"/>
+                      <a:gd name="connsiteY10" fmla="*/ 785095 h 1163917"/>
+                      <a:gd name="connsiteX11" fmla="*/ 6126481 w 7648303"/>
+                      <a:gd name="connsiteY11" fmla="*/ 954913 h 1163917"/>
+                      <a:gd name="connsiteX12" fmla="*/ 6952983 w 7648303"/>
+                      <a:gd name="connsiteY12" fmla="*/ 1057530 h 1163917"/>
+                      <a:gd name="connsiteX13" fmla="*/ 7648303 w 7648303"/>
+                      <a:gd name="connsiteY13" fmla="*/ 1092072 h 1163917"/>
+                    </a:gdLst>
+                    <a:ahLst/>
+                    <a:cxnLst>
+                      <a:cxn ang="0">
+                        <a:pos x="connsiteX0" y="connsiteY0"/>
+                      </a:cxn>
+                      <a:cxn ang="0">
+                        <a:pos x="connsiteX1" y="connsiteY1"/>
+                      </a:cxn>
+                      <a:cxn ang="0">
+                        <a:pos x="connsiteX2" y="connsiteY2"/>
+                      </a:cxn>
+                      <a:cxn ang="0">
+                        <a:pos x="connsiteX3" y="connsiteY3"/>
+                      </a:cxn>
+                      <a:cxn ang="0">
+                        <a:pos x="connsiteX4" y="connsiteY4"/>
+                      </a:cxn>
+                      <a:cxn ang="0">
+                        <a:pos x="connsiteX5" y="connsiteY5"/>
+                      </a:cxn>
+                      <a:cxn ang="0">
+                        <a:pos x="connsiteX6" y="connsiteY6"/>
+                      </a:cxn>
+                      <a:cxn ang="0">
+                        <a:pos x="connsiteX7" y="connsiteY7"/>
+                      </a:cxn>
+                      <a:cxn ang="0">
+                        <a:pos x="connsiteX8" y="connsiteY8"/>
+                      </a:cxn>
+                      <a:cxn ang="0">
+                        <a:pos x="connsiteX9" y="connsiteY9"/>
+                      </a:cxn>
+                      <a:cxn ang="0">
+                        <a:pos x="connsiteX10" y="connsiteY10"/>
+                      </a:cxn>
+                      <a:cxn ang="0">
+                        <a:pos x="connsiteX11" y="connsiteY11"/>
+                      </a:cxn>
+                      <a:cxn ang="0">
+                        <a:pos x="connsiteX12" y="connsiteY12"/>
+                      </a:cxn>
+                      <a:cxn ang="0">
+                        <a:pos x="connsiteX13" y="connsiteY13"/>
+                      </a:cxn>
+                    </a:cxnLst>
+                    <a:rect l="l" t="t" r="r" b="b"/>
+                    <a:pathLst>
+                      <a:path w="7648303" h="1163917" extrusionOk="0">
+                        <a:moveTo>
+                          <a:pt x="0" y="1163917"/>
+                        </a:moveTo>
+                        <a:cubicBezTo>
+                          <a:pt x="50563" y="1128320"/>
+                          <a:pt x="273482" y="1187631"/>
+                          <a:pt x="545652" y="1148969"/>
+                        </a:cubicBezTo>
+                        <a:cubicBezTo>
+                          <a:pt x="701440" y="1139447"/>
+                          <a:pt x="798608" y="1150061"/>
+                          <a:pt x="970194" y="1122844"/>
+                        </a:cubicBezTo>
+                        <a:cubicBezTo>
+                          <a:pt x="1105458" y="1121670"/>
+                          <a:pt x="1356171" y="1050528"/>
+                          <a:pt x="1528354" y="896129"/>
+                        </a:cubicBezTo>
+                        <a:cubicBezTo>
+                          <a:pt x="1671076" y="770024"/>
+                          <a:pt x="1828334" y="577657"/>
+                          <a:pt x="1959429" y="438929"/>
+                        </a:cubicBezTo>
+                        <a:cubicBezTo>
+                          <a:pt x="2113183" y="308978"/>
+                          <a:pt x="2239412" y="180358"/>
+                          <a:pt x="2416629" y="112358"/>
+                        </a:cubicBezTo>
+                        <a:cubicBezTo>
+                          <a:pt x="2576184" y="36352"/>
+                          <a:pt x="2713191" y="28036"/>
+                          <a:pt x="3037114" y="1324"/>
+                        </a:cubicBezTo>
+                        <a:cubicBezTo>
+                          <a:pt x="3339573" y="-29711"/>
+                          <a:pt x="3865835" y="79534"/>
+                          <a:pt x="4245429" y="60107"/>
+                        </a:cubicBezTo>
+                        <a:cubicBezTo>
+                          <a:pt x="4605829" y="101472"/>
+                          <a:pt x="4933825" y="137562"/>
+                          <a:pt x="5094514" y="190735"/>
+                        </a:cubicBezTo>
+                        <a:cubicBezTo>
+                          <a:pt x="5295489" y="254398"/>
+                          <a:pt x="5396831" y="355352"/>
+                          <a:pt x="5512526" y="451992"/>
+                        </a:cubicBezTo>
+                        <a:cubicBezTo>
+                          <a:pt x="5644496" y="570875"/>
+                          <a:pt x="5706149" y="722350"/>
+                          <a:pt x="5806440" y="785095"/>
+                        </a:cubicBezTo>
+                        <a:cubicBezTo>
+                          <a:pt x="5912925" y="875321"/>
+                          <a:pt x="5968363" y="924670"/>
+                          <a:pt x="6126481" y="954913"/>
+                        </a:cubicBezTo>
+                        <a:cubicBezTo>
+                          <a:pt x="6317969" y="972606"/>
+                          <a:pt x="6705990" y="1003418"/>
+                          <a:pt x="6952983" y="1057530"/>
+                        </a:cubicBezTo>
+                        <a:cubicBezTo>
+                          <a:pt x="7190417" y="1083051"/>
+                          <a:pt x="7492325" y="1070485"/>
+                          <a:pt x="7648303" y="1092072"/>
+                        </a:cubicBezTo>
+                      </a:path>
+                    </a:pathLst>
+                  </a:custGeom>
+                  <ask:type>
+                    <ask:lineSketchNone/>
+                  </ask:type>
+                </ask:lineSketchStyleProps>
+              </a:ext>
+            </a:extLst>
+          </a:ln>
+          <a:effectLst/>
+        </p:spPr>
+        <p:style>
+          <a:lnRef idx="1">
+            <a:schemeClr val="accent1"/>
+          </a:lnRef>
+          <a:fillRef idx="3">
+            <a:schemeClr val="accent1"/>
+          </a:fillRef>
+          <a:effectRef idx="2">
+            <a:schemeClr val="accent1"/>
+          </a:effectRef>
+          <a:fontRef idx="minor">
+            <a:schemeClr val="lt1"/>
+          </a:fontRef>
+        </p:style>
+        <p:txBody>
+          <a:bodyPr rtlCol="0" anchor="ctr"/>
+          <a:lstStyle/>
+          <a:p>
+            <a:pPr algn="ctr"/>
+            <a:endParaRPr lang="fr-FR" dirty="0"/>
+          </a:p>
+        </p:txBody>
+      </p:sp>
+      <p:cxnSp>
+        <p:nvCxnSpPr>
+          <p:cNvPr id="26" name="Connecteur droit avec flèche 25">
+            <a:extLst>
+              <a:ext uri="{FF2B5EF4-FFF2-40B4-BE49-F238E27FC236}">
+                <a16:creationId xmlns:a16="http://schemas.microsoft.com/office/drawing/2014/main" id="{E2E4AFB3-CA2B-E140-90E3-F26E35EB28AD}"/>
+              </a:ext>
+            </a:extLst>
+          </p:cNvPr>
+          <p:cNvCxnSpPr>
+            <a:cxnSpLocks/>
+          </p:cNvCxnSpPr>
+          <p:nvPr/>
+        </p:nvCxnSpPr>
+        <p:spPr>
+          <a:xfrm flipV="1">
+            <a:off x="1143248" y="3141794"/>
+            <a:ext cx="0" cy="1169985"/>
+          </a:xfrm>
+          <a:prstGeom prst="straightConnector1">
+            <a:avLst/>
+          </a:prstGeom>
+          <a:ln w="12700">
+            <a:solidFill>
+              <a:schemeClr val="tx1">
+                <a:lumMod val="50000"/>
+                <a:lumOff val="50000"/>
+              </a:schemeClr>
+            </a:solidFill>
+            <a:tailEnd type="triangle"/>
+          </a:ln>
+          <a:effectLst/>
+        </p:spPr>
+        <p:style>
+          <a:lnRef idx="2">
+            <a:schemeClr val="accent1"/>
+          </a:lnRef>
+          <a:fillRef idx="0">
+            <a:schemeClr val="accent1"/>
+          </a:fillRef>
+          <a:effectRef idx="1">
+            <a:schemeClr val="accent1"/>
+          </a:effectRef>
+          <a:fontRef idx="minor">
+            <a:schemeClr val="tx1"/>
+          </a:fontRef>
+        </p:style>
+      </p:cxnSp>
+      <p:cxnSp>
+        <p:nvCxnSpPr>
+          <p:cNvPr id="47" name="Connecteur droit avec flèche 46">
+            <a:extLst>
+              <a:ext uri="{FF2B5EF4-FFF2-40B4-BE49-F238E27FC236}">
+                <a16:creationId xmlns:a16="http://schemas.microsoft.com/office/drawing/2014/main" id="{5F52299A-2205-BB47-9680-EAA55421738D}"/>
+              </a:ext>
+            </a:extLst>
+          </p:cNvPr>
+          <p:cNvCxnSpPr>
+            <a:cxnSpLocks/>
+          </p:cNvCxnSpPr>
+          <p:nvPr/>
+        </p:nvCxnSpPr>
+        <p:spPr>
+          <a:xfrm flipV="1">
+            <a:off x="3052602" y="3015779"/>
+            <a:ext cx="0" cy="1296000"/>
+          </a:xfrm>
+          <a:prstGeom prst="straightConnector1">
+            <a:avLst/>
+          </a:prstGeom>
+          <a:ln w="9525">
+            <a:solidFill>
+              <a:schemeClr val="tx1">
+                <a:lumMod val="50000"/>
+                <a:lumOff val="50000"/>
+              </a:schemeClr>
+            </a:solidFill>
+            <a:prstDash val="dash"/>
+            <a:tailEnd type="none"/>
+          </a:ln>
+          <a:effectLst/>
+        </p:spPr>
+        <p:style>
+          <a:lnRef idx="2">
+            <a:schemeClr val="accent1"/>
+          </a:lnRef>
+          <a:fillRef idx="0">
+            <a:schemeClr val="accent1"/>
+          </a:fillRef>
+          <a:effectRef idx="1">
+            <a:schemeClr val="accent1"/>
+          </a:effectRef>
+          <a:fontRef idx="minor">
+            <a:schemeClr val="tx1"/>
+          </a:fontRef>
+        </p:style>
+      </p:cxnSp>
+      <p:cxnSp>
+        <p:nvCxnSpPr>
+          <p:cNvPr id="49" name="Connecteur droit avec flèche 48">
+            <a:extLst>
+              <a:ext uri="{FF2B5EF4-FFF2-40B4-BE49-F238E27FC236}">
+                <a16:creationId xmlns:a16="http://schemas.microsoft.com/office/drawing/2014/main" id="{8192C4BA-7E3D-0949-A9C3-8D58016D2CC6}"/>
+              </a:ext>
+            </a:extLst>
+          </p:cNvPr>
+          <p:cNvCxnSpPr>
+            <a:cxnSpLocks/>
+          </p:cNvCxnSpPr>
+          <p:nvPr/>
+        </p:nvCxnSpPr>
+        <p:spPr>
+          <a:xfrm flipV="1">
+            <a:off x="4888108" y="3015779"/>
+            <a:ext cx="0" cy="1296000"/>
+          </a:xfrm>
+          <a:prstGeom prst="straightConnector1">
+            <a:avLst/>
+          </a:prstGeom>
+          <a:ln w="9525">
+            <a:solidFill>
+              <a:schemeClr val="tx1">
+                <a:lumMod val="50000"/>
+                <a:lumOff val="50000"/>
+              </a:schemeClr>
+            </a:solidFill>
+            <a:prstDash val="dash"/>
+            <a:tailEnd type="none"/>
+          </a:ln>
+          <a:effectLst/>
+        </p:spPr>
+        <p:style>
+          <a:lnRef idx="2">
+            <a:schemeClr val="accent1"/>
+          </a:lnRef>
+          <a:fillRef idx="0">
+            <a:schemeClr val="accent1"/>
+          </a:fillRef>
+          <a:effectRef idx="1">
+            <a:schemeClr val="accent1"/>
+          </a:effectRef>
+          <a:fontRef idx="minor">
+            <a:schemeClr val="tx1"/>
+          </a:fontRef>
+        </p:style>
+      </p:cxnSp>
+      <p:cxnSp>
+        <p:nvCxnSpPr>
+          <p:cNvPr id="50" name="Connecteur droit avec flèche 49">
+            <a:extLst>
+              <a:ext uri="{FF2B5EF4-FFF2-40B4-BE49-F238E27FC236}">
+                <a16:creationId xmlns:a16="http://schemas.microsoft.com/office/drawing/2014/main" id="{649D5B87-B229-B046-B7DA-9E453156AC31}"/>
+              </a:ext>
+            </a:extLst>
+          </p:cNvPr>
+          <p:cNvCxnSpPr>
+            <a:cxnSpLocks/>
+          </p:cNvCxnSpPr>
+          <p:nvPr/>
+        </p:nvCxnSpPr>
+        <p:spPr>
+          <a:xfrm flipV="1">
+            <a:off x="6723615" y="3015779"/>
+            <a:ext cx="0" cy="1296000"/>
+          </a:xfrm>
+          <a:prstGeom prst="straightConnector1">
+            <a:avLst/>
+          </a:prstGeom>
+          <a:ln w="9525">
+            <a:solidFill>
+              <a:schemeClr val="tx1">
+                <a:lumMod val="50000"/>
+                <a:lumOff val="50000"/>
+              </a:schemeClr>
+            </a:solidFill>
+            <a:prstDash val="dash"/>
+            <a:tailEnd type="none"/>
+          </a:ln>
+          <a:effectLst/>
+        </p:spPr>
+        <p:style>
+          <a:lnRef idx="2">
+            <a:schemeClr val="accent1"/>
+          </a:lnRef>
+          <a:fillRef idx="0">
+            <a:schemeClr val="accent1"/>
+          </a:fillRef>
+          <a:effectRef idx="1">
+            <a:schemeClr val="accent1"/>
+          </a:effectRef>
+          <a:fontRef idx="minor">
+            <a:schemeClr val="tx1"/>
+          </a:fontRef>
+        </p:style>
+      </p:cxnSp>
+      <p:sp>
+        <p:nvSpPr>
+          <p:cNvPr id="56" name="ZoneTexte 55">
+            <a:extLst>
+              <a:ext uri="{FF2B5EF4-FFF2-40B4-BE49-F238E27FC236}">
+                <a16:creationId xmlns:a16="http://schemas.microsoft.com/office/drawing/2014/main" id="{7932E0A2-8068-6940-A6A4-115420BA9991}"/>
+              </a:ext>
+            </a:extLst>
+          </p:cNvPr>
+          <p:cNvSpPr txBox="1"/>
+          <p:nvPr/>
+        </p:nvSpPr>
+        <p:spPr>
+          <a:xfrm>
+            <a:off x="628639" y="3133408"/>
+            <a:ext cx="508473" cy="246221"/>
+          </a:xfrm>
+          <a:prstGeom prst="rect">
+            <a:avLst/>
+          </a:prstGeom>
+          <a:noFill/>
+        </p:spPr>
+        <p:txBody>
+          <a:bodyPr wrap="none" rtlCol="0">
+            <a:spAutoFit/>
+          </a:bodyPr>
+          <a:lstStyle/>
+          <a:p>
+            <a:r>
+              <a:rPr lang="fr-FR" sz="1000" dirty="0">
+                <a:solidFill>
+                  <a:schemeClr val="tx1">
+                    <a:lumMod val="65000"/>
+                    <a:lumOff val="35000"/>
+                  </a:schemeClr>
+                </a:solidFill>
+              </a:rPr>
+              <a:t>Usage</a:t>
+            </a:r>
+          </a:p>
+        </p:txBody>
+      </p:sp>
+      <p:cxnSp>
+        <p:nvCxnSpPr>
+          <p:cNvPr id="58" name="Connecteur droit avec flèche 57">
+            <a:extLst>
+              <a:ext uri="{FF2B5EF4-FFF2-40B4-BE49-F238E27FC236}">
+                <a16:creationId xmlns:a16="http://schemas.microsoft.com/office/drawing/2014/main" id="{C38D8DD9-D729-9940-8600-440BD9DBD70E}"/>
+              </a:ext>
+            </a:extLst>
+          </p:cNvPr>
+          <p:cNvCxnSpPr>
+            <a:cxnSpLocks/>
+          </p:cNvCxnSpPr>
+          <p:nvPr/>
+        </p:nvCxnSpPr>
+        <p:spPr>
+          <a:xfrm>
+            <a:off x="1138450" y="4313969"/>
+            <a:ext cx="7567501" cy="9938"/>
+          </a:xfrm>
+          <a:prstGeom prst="straightConnector1">
+            <a:avLst/>
+          </a:prstGeom>
+          <a:ln w="12700">
+            <a:solidFill>
+              <a:schemeClr val="tx1">
+                <a:lumMod val="50000"/>
+                <a:lumOff val="50000"/>
+              </a:schemeClr>
+            </a:solidFill>
+            <a:tailEnd type="triangle"/>
+          </a:ln>
+          <a:effectLst/>
+        </p:spPr>
+        <p:style>
+          <a:lnRef idx="2">
+            <a:schemeClr val="accent1"/>
+          </a:lnRef>
+          <a:fillRef idx="0">
+            <a:schemeClr val="accent1"/>
+          </a:fillRef>
+          <a:effectRef idx="1">
+            <a:schemeClr val="accent1"/>
+          </a:effectRef>
+          <a:fontRef idx="minor">
+            <a:schemeClr val="tx1"/>
+          </a:fontRef>
+        </p:style>
+      </p:cxnSp>
+      <p:sp>
+        <p:nvSpPr>
+          <p:cNvPr id="60" name="ZoneTexte 59">
+            <a:extLst>
+              <a:ext uri="{FF2B5EF4-FFF2-40B4-BE49-F238E27FC236}">
+                <a16:creationId xmlns:a16="http://schemas.microsoft.com/office/drawing/2014/main" id="{ADC19192-CE84-CE4F-8385-7E0E51568B27}"/>
+              </a:ext>
+            </a:extLst>
+          </p:cNvPr>
+          <p:cNvSpPr txBox="1"/>
+          <p:nvPr/>
+        </p:nvSpPr>
+        <p:spPr>
+          <a:xfrm>
+            <a:off x="8451714" y="4326097"/>
+            <a:ext cx="442750" cy="246221"/>
+          </a:xfrm>
+          <a:prstGeom prst="rect">
+            <a:avLst/>
+          </a:prstGeom>
+          <a:noFill/>
+        </p:spPr>
+        <p:txBody>
+          <a:bodyPr wrap="none" rtlCol="0">
+            <a:spAutoFit/>
+          </a:bodyPr>
+          <a:lstStyle/>
+          <a:p>
+            <a:r>
+              <a:rPr lang="fr-FR" sz="1000" dirty="0">
+                <a:solidFill>
+                  <a:schemeClr val="tx1">
+                    <a:lumMod val="65000"/>
+                    <a:lumOff val="35000"/>
+                  </a:schemeClr>
+                </a:solidFill>
+              </a:rPr>
+              <a:t>Time</a:t>
             </a:r>
           </a:p>
         </p:txBody>
@@ -19424,6 +21117,24 @@
 </file>
 
 <file path=ppt/tags/tag12.xml><?xml version="1.0" encoding="utf-8"?>
+<p:tagLst xmlns:a="http://schemas.openxmlformats.org/drawingml/2006/main" xmlns:r="http://schemas.openxmlformats.org/officeDocument/2006/relationships" xmlns:p="http://schemas.openxmlformats.org/presentationml/2006/main">
+  <p:tag name="THINKCELLSHAPEDONOTDELETE" val="thinkcellActiveDocDoNotDelete"/>
+</p:tagLst>
+</file>
+
+<file path=ppt/tags/tag13.xml><?xml version="1.0" encoding="utf-8"?>
+<p:tagLst xmlns:a="http://schemas.openxmlformats.org/drawingml/2006/main" xmlns:r="http://schemas.openxmlformats.org/officeDocument/2006/relationships" xmlns:p="http://schemas.openxmlformats.org/presentationml/2006/main">
+  <p:tag name="THINKCELLSHAPEDONOTDELETE" val="thinkcellActiveDocDoNotDelete"/>
+</p:tagLst>
+</file>
+
+<file path=ppt/tags/tag14.xml><?xml version="1.0" encoding="utf-8"?>
+<p:tagLst xmlns:a="http://schemas.openxmlformats.org/drawingml/2006/main" xmlns:r="http://schemas.openxmlformats.org/officeDocument/2006/relationships" xmlns:p="http://schemas.openxmlformats.org/presentationml/2006/main">
+  <p:tag name="THINKCELLSHAPEDONOTDELETE" val="thinkcellActiveDocDoNotDelete"/>
+</p:tagLst>
+</file>
+
+<file path=ppt/tags/tag15.xml><?xml version="1.0" encoding="utf-8"?>
 <p:tagLst xmlns:a="http://schemas.openxmlformats.org/drawingml/2006/main" xmlns:r="http://schemas.openxmlformats.org/officeDocument/2006/relationships" xmlns:p="http://schemas.openxmlformats.org/presentationml/2006/main">
   <p:tag name="THINKCELLSHAPEDONOTDELETE" val="thinkcellActiveDocDoNotDelete"/>
 </p:tagLst>
@@ -22678,21 +24389,6 @@
 </file>
 
 <file path=customXml/item1.xml><?xml version="1.0" encoding="utf-8"?>
-<?mso-contentType ?>
-<FormTemplates xmlns="http://schemas.microsoft.com/sharepoint/v3/contenttype/forms">
-  <Display>DocumentLibraryForm</Display>
-  <Edit>DocumentLibraryForm</Edit>
-  <New>DocumentLibraryForm</New>
-</FormTemplates>
-</file>
-
-<file path=customXml/item2.xml><?xml version="1.0" encoding="utf-8"?>
-<p:properties xmlns:p="http://schemas.microsoft.com/office/2006/metadata/properties" xmlns:xsi="http://www.w3.org/2001/XMLSchema-instance" xmlns:pc="http://schemas.microsoft.com/office/infopath/2007/PartnerControls">
-  <documentManagement/>
-</p:properties>
-</file>
-
-<file path=customXml/item3.xml><?xml version="1.0" encoding="utf-8"?>
 <ct:contentTypeSchema xmlns:ct="http://schemas.microsoft.com/office/2006/metadata/contentType" xmlns:ma="http://schemas.microsoft.com/office/2006/metadata/properties/metaAttributes" ct:_="" ma:_="" ma:contentTypeName="Document" ma:contentTypeID="0x010100C8B6676EFF43BD44A973BAF3C3F8897C" ma:contentTypeVersion="11" ma:contentTypeDescription="Crée un document." ma:contentTypeScope="" ma:versionID="16055b838173ea074c74866c85749e9f">
   <xsd:schema xmlns:xsd="http://www.w3.org/2001/XMLSchema" xmlns:xs="http://www.w3.org/2001/XMLSchema" xmlns:p="http://schemas.microsoft.com/office/2006/metadata/properties" xmlns:ns3="e2e26994-5e48-4994-8c16-0b6f61c4bc8a" xmlns:ns4="9f09b4db-7fdb-4a79-a1ce-e7e1d5ac2b17" targetNamespace="http://schemas.microsoft.com/office/2006/metadata/properties" ma:root="true" ma:fieldsID="7356ef530764415288c8753ef1e753cb" ns3:_="" ns4:_="">
     <xsd:import namespace="e2e26994-5e48-4994-8c16-0b6f61c4bc8a"/>
@@ -22901,10 +24597,36 @@
 </ct:contentTypeSchema>
 </file>
 
+<file path=customXml/item2.xml><?xml version="1.0" encoding="utf-8"?>
+<p:properties xmlns:p="http://schemas.microsoft.com/office/2006/metadata/properties" xmlns:xsi="http://www.w3.org/2001/XMLSchema-instance" xmlns:pc="http://schemas.microsoft.com/office/infopath/2007/PartnerControls">
+  <documentManagement/>
+</p:properties>
+</file>
+
+<file path=customXml/item3.xml><?xml version="1.0" encoding="utf-8"?>
+<?mso-contentType ?>
+<FormTemplates xmlns="http://schemas.microsoft.com/sharepoint/v3/contenttype/forms">
+  <Display>DocumentLibraryForm</Display>
+  <Edit>DocumentLibraryForm</Edit>
+  <New>DocumentLibraryForm</New>
+</FormTemplates>
+</file>
+
 <file path=customXml/itemProps1.xml><?xml version="1.0" encoding="utf-8"?>
-<ds:datastoreItem xmlns:ds="http://schemas.openxmlformats.org/officeDocument/2006/customXml" ds:itemID="{7345BF31-44AE-4465-BECF-E43C8C381DB2}">
+<ds:datastoreItem xmlns:ds="http://schemas.openxmlformats.org/officeDocument/2006/customXml" ds:itemID="{FEFC16D8-2F60-4844-97AE-E0BD300158EA}">
   <ds:schemaRefs>
-    <ds:schemaRef ds:uri="http://schemas.microsoft.com/sharepoint/v3/contenttype/forms"/>
+    <ds:schemaRef ds:uri="http://schemas.microsoft.com/office/2006/metadata/contentType"/>
+    <ds:schemaRef ds:uri="http://schemas.microsoft.com/office/2006/metadata/properties/metaAttributes"/>
+    <ds:schemaRef ds:uri="http://www.w3.org/2001/XMLSchema"/>
+    <ds:schemaRef ds:uri="http://schemas.microsoft.com/office/2006/metadata/properties"/>
+    <ds:schemaRef ds:uri="e2e26994-5e48-4994-8c16-0b6f61c4bc8a"/>
+    <ds:schemaRef ds:uri="9f09b4db-7fdb-4a79-a1ce-e7e1d5ac2b17"/>
+    <ds:schemaRef ds:uri="http://schemas.microsoft.com/office/2006/documentManagement/types"/>
+    <ds:schemaRef ds:uri="http://schemas.microsoft.com/office/infopath/2007/PartnerControls"/>
+    <ds:schemaRef ds:uri="http://schemas.openxmlformats.org/package/2006/metadata/core-properties"/>
+    <ds:schemaRef ds:uri="http://purl.org/dc/elements/1.1/"/>
+    <ds:schemaRef ds:uri="http://purl.org/dc/terms/"/>
+    <ds:schemaRef ds:uri="http://schemas.microsoft.com/internal/obd"/>
   </ds:schemaRefs>
 </ds:datastoreItem>
 </file>
@@ -22927,20 +24649,9 @@
 </file>
 
 <file path=customXml/itemProps3.xml><?xml version="1.0" encoding="utf-8"?>
-<ds:datastoreItem xmlns:ds="http://schemas.openxmlformats.org/officeDocument/2006/customXml" ds:itemID="{FEFC16D8-2F60-4844-97AE-E0BD300158EA}">
+<ds:datastoreItem xmlns:ds="http://schemas.openxmlformats.org/officeDocument/2006/customXml" ds:itemID="{7345BF31-44AE-4465-BECF-E43C8C381DB2}">
   <ds:schemaRefs>
-    <ds:schemaRef ds:uri="http://schemas.microsoft.com/office/2006/metadata/contentType"/>
-    <ds:schemaRef ds:uri="http://schemas.microsoft.com/office/2006/metadata/properties/metaAttributes"/>
-    <ds:schemaRef ds:uri="http://www.w3.org/2001/XMLSchema"/>
-    <ds:schemaRef ds:uri="http://schemas.microsoft.com/office/2006/metadata/properties"/>
-    <ds:schemaRef ds:uri="e2e26994-5e48-4994-8c16-0b6f61c4bc8a"/>
-    <ds:schemaRef ds:uri="9f09b4db-7fdb-4a79-a1ce-e7e1d5ac2b17"/>
-    <ds:schemaRef ds:uri="http://schemas.microsoft.com/office/2006/documentManagement/types"/>
-    <ds:schemaRef ds:uri="http://schemas.microsoft.com/office/infopath/2007/PartnerControls"/>
-    <ds:schemaRef ds:uri="http://schemas.openxmlformats.org/package/2006/metadata/core-properties"/>
-    <ds:schemaRef ds:uri="http://purl.org/dc/elements/1.1/"/>
-    <ds:schemaRef ds:uri="http://purl.org/dc/terms/"/>
-    <ds:schemaRef ds:uri="http://schemas.microsoft.com/internal/obd"/>
+    <ds:schemaRef ds:uri="http://schemas.microsoft.com/sharepoint/v3/contenttype/forms"/>
   </ds:schemaRefs>
 </ds:datastoreItem>
 </file>
</xml_diff>

<commit_message>
Replace 'PI' by 'Product Increment' in 'From idea to retirement' poster
</commit_message>
<xml_diff>
--- a/Assets/1.Landmarks Posters/Continuous Architecture Generic - From Idea to Retirement - 2020.2.pptx
+++ b/Assets/1.Landmarks Posters/Continuous Architecture Generic - From Idea to Retirement - 2020.2.pptx
@@ -271,7 +271,7 @@
           <a:p>
             <a:fld id="{9BFAC1C7-9E5D-4441-A8DE-D4FA72AEF22D}" type="datetimeFigureOut">
               <a:rPr lang="fr-FR" smtClean="0"/>
-              <a:t>25/11/2020</a:t>
+              <a:t>15/12/2020</a:t>
             </a:fld>
             <a:endParaRPr lang="fr-FR"/>
           </a:p>
@@ -437,7 +437,7 @@
           <a:p>
             <a:fld id="{6D15EC3C-BFA7-9E4C-BB13-BAA5658834CA}" type="datetimeFigureOut">
               <a:rPr lang="fr-FR" smtClean="0"/>
-              <a:t>25/11/2020</a:t>
+              <a:t>15/12/2020</a:t>
             </a:fld>
             <a:endParaRPr lang="fr-FR"/>
           </a:p>
@@ -2896,7 +2896,7 @@
           <a:graphicData uri="http://schemas.openxmlformats.org/presentationml/2006/ole">
             <mc:AlternateContent xmlns:mc="http://schemas.openxmlformats.org/markup-compatibility/2006">
               <mc:Choice xmlns:v="urn:schemas-microsoft-com:vml" Requires="v">
-                <p:oleObj spid="_x0000_s3081" name="Diapositive think-cell" r:id="rId4" imgW="270" imgH="270" progId="TCLayout.ActiveDocument.1">
+                <p:oleObj spid="_x0000_s3083" name="Diapositive think-cell" r:id="rId4" imgW="270" imgH="270" progId="TCLayout.ActiveDocument.1">
                   <p:embed/>
                 </p:oleObj>
               </mc:Choice>
@@ -5037,7 +5037,7 @@
               <a:pPr>
                 <a:defRPr/>
               </a:pPr>
-              <a:t>25/11/2020</a:t>
+              <a:t>15/12/2020</a:t>
             </a:fld>
             <a:endParaRPr lang="fr-FR"/>
           </a:p>
@@ -5692,7 +5692,7 @@
           <a:graphicData uri="http://schemas.openxmlformats.org/presentationml/2006/ole">
             <mc:AlternateContent xmlns:mc="http://schemas.openxmlformats.org/markup-compatibility/2006">
               <mc:Choice xmlns:v="urn:schemas-microsoft-com:vml" Requires="v">
-                <p:oleObj spid="_x0000_s5129" name="Diapositive think-cell" r:id="rId4" imgW="270" imgH="270" progId="TCLayout.ActiveDocument.1">
+                <p:oleObj spid="_x0000_s5131" name="Diapositive think-cell" r:id="rId4" imgW="270" imgH="270" progId="TCLayout.ActiveDocument.1">
                   <p:embed/>
                 </p:oleObj>
               </mc:Choice>
@@ -7005,7 +7005,7 @@
           <a:graphicData uri="http://schemas.openxmlformats.org/presentationml/2006/ole">
             <mc:AlternateContent xmlns:mc="http://schemas.openxmlformats.org/markup-compatibility/2006">
               <mc:Choice xmlns:v="urn:schemas-microsoft-com:vml" Requires="v">
-                <p:oleObj spid="_x0000_s7177" name="Diapositive think-cell" r:id="rId4" imgW="270" imgH="270" progId="TCLayout.ActiveDocument.1">
+                <p:oleObj spid="_x0000_s7179" name="Diapositive think-cell" r:id="rId4" imgW="270" imgH="270" progId="TCLayout.ActiveDocument.1">
                   <p:embed/>
                 </p:oleObj>
               </mc:Choice>
@@ -9563,7 +9563,7 @@
           <a:graphicData uri="http://schemas.openxmlformats.org/presentationml/2006/ole">
             <mc:AlternateContent xmlns:mc="http://schemas.openxmlformats.org/markup-compatibility/2006">
               <mc:Choice xmlns:v="urn:schemas-microsoft-com:vml" Requires="v">
-                <p:oleObj spid="_x0000_s9225" name="Diapositive think-cell" r:id="rId4" imgW="270" imgH="270" progId="TCLayout.ActiveDocument.1">
+                <p:oleObj spid="_x0000_s9227" name="Diapositive think-cell" r:id="rId4" imgW="270" imgH="270" progId="TCLayout.ActiveDocument.1">
                   <p:embed/>
                 </p:oleObj>
               </mc:Choice>
@@ -11389,7 +11389,7 @@
           <a:graphicData uri="http://schemas.openxmlformats.org/presentationml/2006/ole">
             <mc:AlternateContent xmlns:mc="http://schemas.openxmlformats.org/markup-compatibility/2006">
               <mc:Choice xmlns:v="urn:schemas-microsoft-com:vml" Requires="v">
-                <p:oleObj spid="_x0000_s11273" name="Diapositive think-cell" r:id="rId4" imgW="270" imgH="270" progId="TCLayout.ActiveDocument.1">
+                <p:oleObj spid="_x0000_s11275" name="Diapositive think-cell" r:id="rId4" imgW="270" imgH="270" progId="TCLayout.ActiveDocument.1">
                   <p:embed/>
                 </p:oleObj>
               </mc:Choice>
@@ -12710,7 +12710,7 @@
               <a:pPr>
                 <a:defRPr/>
               </a:pPr>
-              <a:t>25/11/2020</a:t>
+              <a:t>15/12/2020</a:t>
             </a:fld>
             <a:endParaRPr lang="fr-FR"/>
           </a:p>
@@ -16163,7 +16163,7 @@
           <a:graphicData uri="http://schemas.openxmlformats.org/presentationml/2006/ole">
             <mc:AlternateContent xmlns:mc="http://schemas.openxmlformats.org/markup-compatibility/2006">
               <mc:Choice xmlns:v="urn:schemas-microsoft-com:vml" Requires="v">
-                <p:oleObj spid="_x0000_s1033" name="Diapositive think-cell" r:id="rId12" imgW="270" imgH="270" progId="TCLayout.ActiveDocument.1">
+                <p:oleObj spid="_x0000_s1035" name="Diapositive think-cell" r:id="rId12" imgW="270" imgH="270" progId="TCLayout.ActiveDocument.1">
                   <p:embed/>
                 </p:oleObj>
               </mc:Choice>
@@ -16523,7 +16523,7 @@
           <a:graphicData uri="http://schemas.openxmlformats.org/presentationml/2006/ole">
             <mc:AlternateContent xmlns:mc="http://schemas.openxmlformats.org/markup-compatibility/2006">
               <mc:Choice xmlns:v="urn:schemas-microsoft-com:vml" Requires="v">
-                <p:oleObj spid="_x0000_s16389" name="Diapositive think-cell" r:id="rId11" imgW="7772400" imgH="10058400" progId="TCLayout.ActiveDocument.1">
+                <p:oleObj spid="_x0000_s16391" name="Diapositive think-cell" r:id="rId11" imgW="7772400" imgH="10058400" progId="TCLayout.ActiveDocument.1">
                   <p:embed/>
                 </p:oleObj>
               </mc:Choice>
@@ -16876,7 +16876,7 @@
           <a:graphicData uri="http://schemas.openxmlformats.org/presentationml/2006/ole">
             <mc:AlternateContent xmlns:mc="http://schemas.openxmlformats.org/markup-compatibility/2006">
               <mc:Choice xmlns:v="urn:schemas-microsoft-com:vml" Requires="v">
-                <p:oleObj spid="_x0000_s2057" name="Diapositive think-cell" r:id="rId9" imgW="270" imgH="270" progId="TCLayout.ActiveDocument.1">
+                <p:oleObj spid="_x0000_s2059" name="Diapositive think-cell" r:id="rId9" imgW="270" imgH="270" progId="TCLayout.ActiveDocument.1">
                   <p:embed/>
                 </p:oleObj>
               </mc:Choice>
@@ -17232,7 +17232,7 @@
           <a:graphicData uri="http://schemas.openxmlformats.org/presentationml/2006/ole">
             <mc:AlternateContent xmlns:mc="http://schemas.openxmlformats.org/markup-compatibility/2006">
               <mc:Choice xmlns:v="urn:schemas-microsoft-com:vml" Requires="v">
-                <p:oleObj spid="_x0000_s17413" name="Diapositive think-cell" r:id="rId7" imgW="7772400" imgH="10058400" progId="TCLayout.ActiveDocument.1">
+                <p:oleObj spid="_x0000_s17415" name="Diapositive think-cell" r:id="rId7" imgW="7772400" imgH="10058400" progId="TCLayout.ActiveDocument.1">
                   <p:embed/>
                 </p:oleObj>
               </mc:Choice>
@@ -17581,7 +17581,7 @@
           <a:graphicData uri="http://schemas.openxmlformats.org/presentationml/2006/ole">
             <mc:AlternateContent xmlns:mc="http://schemas.openxmlformats.org/markup-compatibility/2006">
               <mc:Choice xmlns:v="urn:schemas-microsoft-com:vml" Requires="v">
-                <p:oleObj spid="_x0000_s4105" name="Diapositive think-cell" r:id="rId7" imgW="270" imgH="270" progId="TCLayout.ActiveDocument.1">
+                <p:oleObj spid="_x0000_s4107" name="Diapositive think-cell" r:id="rId7" imgW="270" imgH="270" progId="TCLayout.ActiveDocument.1">
                   <p:embed/>
                 </p:oleObj>
               </mc:Choice>
@@ -17929,7 +17929,7 @@
           <a:graphicData uri="http://schemas.openxmlformats.org/presentationml/2006/ole">
             <mc:AlternateContent xmlns:mc="http://schemas.openxmlformats.org/markup-compatibility/2006">
               <mc:Choice xmlns:v="urn:schemas-microsoft-com:vml" Requires="v">
-                <p:oleObj spid="_x0000_s6153" name="Diapositive think-cell" r:id="rId8" imgW="270" imgH="270" progId="TCLayout.ActiveDocument.1">
+                <p:oleObj spid="_x0000_s6155" name="Diapositive think-cell" r:id="rId8" imgW="270" imgH="270" progId="TCLayout.ActiveDocument.1">
                   <p:embed/>
                 </p:oleObj>
               </mc:Choice>
@@ -18278,7 +18278,7 @@
           <a:graphicData uri="http://schemas.openxmlformats.org/presentationml/2006/ole">
             <mc:AlternateContent xmlns:mc="http://schemas.openxmlformats.org/markup-compatibility/2006">
               <mc:Choice xmlns:v="urn:schemas-microsoft-com:vml" Requires="v">
-                <p:oleObj spid="_x0000_s8201" name="Diapositive think-cell" r:id="rId8" imgW="270" imgH="270" progId="TCLayout.ActiveDocument.1">
+                <p:oleObj spid="_x0000_s8203" name="Diapositive think-cell" r:id="rId8" imgW="270" imgH="270" progId="TCLayout.ActiveDocument.1">
                   <p:embed/>
                 </p:oleObj>
               </mc:Choice>
@@ -18627,7 +18627,7 @@
           <a:graphicData uri="http://schemas.openxmlformats.org/presentationml/2006/ole">
             <mc:AlternateContent xmlns:mc="http://schemas.openxmlformats.org/markup-compatibility/2006">
               <mc:Choice xmlns:v="urn:schemas-microsoft-com:vml" Requires="v">
-                <p:oleObj spid="_x0000_s10249" name="Diapositive think-cell" r:id="rId8" imgW="270" imgH="270" progId="TCLayout.ActiveDocument.1">
+                <p:oleObj spid="_x0000_s10251" name="Diapositive think-cell" r:id="rId8" imgW="270" imgH="270" progId="TCLayout.ActiveDocument.1">
                   <p:embed/>
                 </p:oleObj>
               </mc:Choice>
@@ -18977,7 +18977,7 @@
           <a:graphicData uri="http://schemas.openxmlformats.org/presentationml/2006/ole">
             <mc:AlternateContent xmlns:mc="http://schemas.openxmlformats.org/markup-compatibility/2006">
               <mc:Choice xmlns:v="urn:schemas-microsoft-com:vml" Requires="v">
-                <p:oleObj spid="_x0000_s18439" name="Diapositive think-cell" r:id="rId4" imgW="7772400" imgH="10058400" progId="TCLayout.ActiveDocument.1">
+                <p:oleObj spid="_x0000_s18441" name="Diapositive think-cell" r:id="rId4" imgW="7772400" imgH="10058400" progId="TCLayout.ActiveDocument.1">
                   <p:embed/>
                 </p:oleObj>
               </mc:Choice>
@@ -19276,528 +19276,6 @@
           </a:prstGeom>
         </p:spPr>
       </p:pic>
-      <p:grpSp>
-        <p:nvGrpSpPr>
-          <p:cNvPr id="23" name="Groupe 22">
-            <a:extLst>
-              <a:ext uri="{FF2B5EF4-FFF2-40B4-BE49-F238E27FC236}">
-                <a16:creationId xmlns:a16="http://schemas.microsoft.com/office/drawing/2014/main" id="{2D54C6E9-5978-9148-B85D-57C0422CA4A7}"/>
-              </a:ext>
-            </a:extLst>
-          </p:cNvPr>
-          <p:cNvGrpSpPr/>
-          <p:nvPr/>
-        </p:nvGrpSpPr>
-        <p:grpSpPr>
-          <a:xfrm>
-            <a:off x="115320" y="860085"/>
-            <a:ext cx="9006114" cy="2698037"/>
-            <a:chOff x="68943" y="1346776"/>
-            <a:chExt cx="9006114" cy="2698037"/>
-          </a:xfrm>
-        </p:grpSpPr>
-        <p:grpSp>
-          <p:nvGrpSpPr>
-            <p:cNvPr id="21" name="Groupe 20">
-              <a:extLst>
-                <a:ext uri="{FF2B5EF4-FFF2-40B4-BE49-F238E27FC236}">
-                  <a16:creationId xmlns:a16="http://schemas.microsoft.com/office/drawing/2014/main" id="{4DF1B3A0-341F-3D40-BBFE-F6E7B1844848}"/>
-                </a:ext>
-              </a:extLst>
-            </p:cNvPr>
-            <p:cNvGrpSpPr/>
-            <p:nvPr/>
-          </p:nvGrpSpPr>
-          <p:grpSpPr>
-            <a:xfrm>
-              <a:off x="68943" y="1346776"/>
-              <a:ext cx="9006114" cy="2698037"/>
-              <a:chOff x="68943" y="1320652"/>
-              <a:chExt cx="9006114" cy="2698037"/>
-            </a:xfrm>
-          </p:grpSpPr>
-          <p:grpSp>
-            <p:nvGrpSpPr>
-              <p:cNvPr id="16" name="Groupe 15">
-                <a:extLst>
-                  <a:ext uri="{FF2B5EF4-FFF2-40B4-BE49-F238E27FC236}">
-                    <a16:creationId xmlns:a16="http://schemas.microsoft.com/office/drawing/2014/main" id="{2D197397-FE9F-CE44-9EAE-47DAFDD9E372}"/>
-                  </a:ext>
-                </a:extLst>
-              </p:cNvPr>
-              <p:cNvGrpSpPr/>
-              <p:nvPr/>
-            </p:nvGrpSpPr>
-            <p:grpSpPr>
-              <a:xfrm>
-                <a:off x="68943" y="1320652"/>
-                <a:ext cx="9006114" cy="2580444"/>
-                <a:chOff x="68943" y="1363312"/>
-                <a:chExt cx="9006114" cy="2580444"/>
-              </a:xfrm>
-            </p:grpSpPr>
-            <p:grpSp>
-              <p:nvGrpSpPr>
-                <p:cNvPr id="5" name="Groupe 4">
-                  <a:extLst>
-                    <a:ext uri="{FF2B5EF4-FFF2-40B4-BE49-F238E27FC236}">
-                      <a16:creationId xmlns:a16="http://schemas.microsoft.com/office/drawing/2014/main" id="{F515D368-AB9E-4A29-8CDB-F0D8F1A1D4D3}"/>
-                    </a:ext>
-                  </a:extLst>
-                </p:cNvPr>
-                <p:cNvGrpSpPr/>
-                <p:nvPr/>
-              </p:nvGrpSpPr>
-              <p:grpSpPr>
-                <a:xfrm>
-                  <a:off x="68943" y="1363312"/>
-                  <a:ext cx="9006114" cy="2580444"/>
-                  <a:chOff x="514129" y="1047016"/>
-                  <a:chExt cx="24171718" cy="6669212"/>
-                </a:xfrm>
-              </p:grpSpPr>
-              <p:pic>
-                <p:nvPicPr>
-                  <p:cNvPr id="2" name="Graphique 1">
-                    <a:extLst>
-                      <a:ext uri="{FF2B5EF4-FFF2-40B4-BE49-F238E27FC236}">
-                        <a16:creationId xmlns:a16="http://schemas.microsoft.com/office/drawing/2014/main" id="{E0A4D984-9D24-4D71-B171-17A6E7370276}"/>
-                      </a:ext>
-                    </a:extLst>
-                  </p:cNvPr>
-                  <p:cNvPicPr>
-                    <a:picLocks noChangeAspect="1"/>
-                  </p:cNvPicPr>
-                  <p:nvPr/>
-                </p:nvPicPr>
-                <p:blipFill>
-                  <a:blip r:embed="rId6">
-                    <a:extLst>
-                      <a:ext uri="{96DAC541-7B7A-43D3-8B79-37D633B846F1}">
-                        <asvg:svgBlip xmlns:asvg="http://schemas.microsoft.com/office/drawing/2016/SVG/main" r:embed="rId7"/>
-                      </a:ext>
-                    </a:extLst>
-                  </a:blip>
-                  <a:stretch>
-                    <a:fillRect/>
-                  </a:stretch>
-                </p:blipFill>
-                <p:spPr>
-                  <a:xfrm>
-                    <a:off x="514129" y="1047016"/>
-                    <a:ext cx="24171718" cy="6669212"/>
-                  </a:xfrm>
-                  <a:prstGeom prst="rect">
-                    <a:avLst/>
-                  </a:prstGeom>
-                </p:spPr>
-              </p:pic>
-              <p:sp>
-                <p:nvSpPr>
-                  <p:cNvPr id="3" name="ZoneTexte 2">
-                    <a:extLst>
-                      <a:ext uri="{FF2B5EF4-FFF2-40B4-BE49-F238E27FC236}">
-                        <a16:creationId xmlns:a16="http://schemas.microsoft.com/office/drawing/2014/main" id="{A4615FE8-2ABF-4500-990D-350AB5BFDF57}"/>
-                      </a:ext>
-                    </a:extLst>
-                  </p:cNvPr>
-                  <p:cNvSpPr txBox="1"/>
-                  <p:nvPr/>
-                </p:nvSpPr>
-                <p:spPr>
-                  <a:xfrm>
-                    <a:off x="11020942" y="4743101"/>
-                    <a:ext cx="1701846" cy="636363"/>
-                  </a:xfrm>
-                  <a:prstGeom prst="rect">
-                    <a:avLst/>
-                  </a:prstGeom>
-                  <a:noFill/>
-                </p:spPr>
-                <p:txBody>
-                  <a:bodyPr wrap="square" rtlCol="0">
-                    <a:spAutoFit/>
-                  </a:bodyPr>
-                  <a:lstStyle/>
-                  <a:p>
-                    <a:r>
-                      <a:rPr lang="fr-FR" sz="500" dirty="0">
-                        <a:solidFill>
-                          <a:srgbClr val="27509B"/>
-                        </a:solidFill>
-                        <a:latin typeface="Gotham Rounded Bold" pitchFamily="50" charset="0"/>
-                      </a:rPr>
-                      <a:t>HEALTH</a:t>
-                    </a:r>
-                  </a:p>
-                  <a:p>
-                    <a:r>
-                      <a:rPr lang="fr-FR" sz="500" dirty="0">
-                        <a:solidFill>
-                          <a:srgbClr val="27509B"/>
-                        </a:solidFill>
-                        <a:latin typeface="Gotham Rounded Bold" pitchFamily="50" charset="0"/>
-                      </a:rPr>
-                      <a:t> CHECK</a:t>
-                    </a:r>
-                  </a:p>
-                </p:txBody>
-              </p:sp>
-              <p:sp>
-                <p:nvSpPr>
-                  <p:cNvPr id="4" name="ZoneTexte 3">
-                    <a:extLst>
-                      <a:ext uri="{FF2B5EF4-FFF2-40B4-BE49-F238E27FC236}">
-                        <a16:creationId xmlns:a16="http://schemas.microsoft.com/office/drawing/2014/main" id="{382A4056-3D21-4D81-96FE-5B83C4677083}"/>
-                      </a:ext>
-                    </a:extLst>
-                  </p:cNvPr>
-                  <p:cNvSpPr txBox="1"/>
-                  <p:nvPr/>
-                </p:nvSpPr>
-                <p:spPr>
-                  <a:xfrm>
-                    <a:off x="17343701" y="4743098"/>
-                    <a:ext cx="1701846" cy="636363"/>
-                  </a:xfrm>
-                  <a:prstGeom prst="rect">
-                    <a:avLst/>
-                  </a:prstGeom>
-                  <a:noFill/>
-                </p:spPr>
-                <p:txBody>
-                  <a:bodyPr wrap="square" rtlCol="0">
-                    <a:spAutoFit/>
-                  </a:bodyPr>
-                  <a:lstStyle/>
-                  <a:p>
-                    <a:r>
-                      <a:rPr lang="fr-FR" sz="500" dirty="0">
-                        <a:solidFill>
-                          <a:srgbClr val="27509B"/>
-                        </a:solidFill>
-                        <a:latin typeface="Gotham Rounded Bold" pitchFamily="50" charset="0"/>
-                      </a:rPr>
-                      <a:t>HEALTH</a:t>
-                    </a:r>
-                  </a:p>
-                  <a:p>
-                    <a:r>
-                      <a:rPr lang="fr-FR" sz="500" dirty="0">
-                        <a:solidFill>
-                          <a:srgbClr val="27509B"/>
-                        </a:solidFill>
-                        <a:latin typeface="Gotham Rounded Bold" pitchFamily="50" charset="0"/>
-                      </a:rPr>
-                      <a:t> CHECK</a:t>
-                    </a:r>
-                  </a:p>
-                </p:txBody>
-              </p:sp>
-            </p:grpSp>
-            <p:sp>
-              <p:nvSpPr>
-                <p:cNvPr id="7" name="ZoneTexte 6">
-                  <a:extLst>
-                    <a:ext uri="{FF2B5EF4-FFF2-40B4-BE49-F238E27FC236}">
-                      <a16:creationId xmlns:a16="http://schemas.microsoft.com/office/drawing/2014/main" id="{2D1F48B4-F11B-4A83-BA61-17138F1ED58D}"/>
-                    </a:ext>
-                  </a:extLst>
-                </p:cNvPr>
-                <p:cNvSpPr txBox="1"/>
-                <p:nvPr/>
-              </p:nvSpPr>
-              <p:spPr>
-                <a:xfrm>
-                  <a:off x="1485349" y="3466846"/>
-                  <a:ext cx="1604017" cy="246221"/>
-                </a:xfrm>
-                <a:prstGeom prst="rect">
-                  <a:avLst/>
-                </a:prstGeom>
-                <a:solidFill>
-                  <a:schemeClr val="bg1"/>
-                </a:solidFill>
-              </p:spPr>
-              <p:txBody>
-                <a:bodyPr wrap="square" rtlCol="0">
-                  <a:spAutoFit/>
-                </a:bodyPr>
-                <a:lstStyle/>
-                <a:p>
-                  <a:endParaRPr lang="fr-FR" sz="1000" dirty="0">
-                    <a:solidFill>
-                      <a:srgbClr val="27509B"/>
-                    </a:solidFill>
-                    <a:latin typeface="Gotham Rounded Bold" pitchFamily="50" charset="0"/>
-                  </a:endParaRPr>
-                </a:p>
-              </p:txBody>
-            </p:sp>
-            <p:sp>
-              <p:nvSpPr>
-                <p:cNvPr id="8" name="ZoneTexte 7">
-                  <a:extLst>
-                    <a:ext uri="{FF2B5EF4-FFF2-40B4-BE49-F238E27FC236}">
-                      <a16:creationId xmlns:a16="http://schemas.microsoft.com/office/drawing/2014/main" id="{EF993AC2-FE4D-489C-A42B-684353DEC631}"/>
-                    </a:ext>
-                  </a:extLst>
-                </p:cNvPr>
-                <p:cNvSpPr txBox="1"/>
-                <p:nvPr/>
-              </p:nvSpPr>
-              <p:spPr>
-                <a:xfrm>
-                  <a:off x="3687716" y="3479534"/>
-                  <a:ext cx="1604017" cy="246221"/>
-                </a:xfrm>
-                <a:prstGeom prst="rect">
-                  <a:avLst/>
-                </a:prstGeom>
-                <a:solidFill>
-                  <a:schemeClr val="bg1"/>
-                </a:solidFill>
-              </p:spPr>
-              <p:txBody>
-                <a:bodyPr wrap="square" rtlCol="0">
-                  <a:spAutoFit/>
-                </a:bodyPr>
-                <a:lstStyle/>
-                <a:p>
-                  <a:endParaRPr lang="fr-FR" sz="1000" dirty="0">
-                    <a:solidFill>
-                      <a:srgbClr val="27509B"/>
-                    </a:solidFill>
-                    <a:latin typeface="Gotham Rounded Bold" pitchFamily="50" charset="0"/>
-                  </a:endParaRPr>
-                </a:p>
-              </p:txBody>
-            </p:sp>
-            <p:sp>
-              <p:nvSpPr>
-                <p:cNvPr id="13" name="ZoneTexte 12">
-                  <a:extLst>
-                    <a:ext uri="{FF2B5EF4-FFF2-40B4-BE49-F238E27FC236}">
-                      <a16:creationId xmlns:a16="http://schemas.microsoft.com/office/drawing/2014/main" id="{E45D6EB2-134A-4CF7-8A33-FCD07878DC39}"/>
-                    </a:ext>
-                  </a:extLst>
-                </p:cNvPr>
-                <p:cNvSpPr txBox="1"/>
-                <p:nvPr/>
-              </p:nvSpPr>
-              <p:spPr>
-                <a:xfrm>
-                  <a:off x="6372807" y="3451313"/>
-                  <a:ext cx="795916" cy="246221"/>
-                </a:xfrm>
-                <a:prstGeom prst="rect">
-                  <a:avLst/>
-                </a:prstGeom>
-                <a:solidFill>
-                  <a:schemeClr val="bg1"/>
-                </a:solidFill>
-              </p:spPr>
-              <p:txBody>
-                <a:bodyPr wrap="square" rtlCol="0">
-                  <a:spAutoFit/>
-                </a:bodyPr>
-                <a:lstStyle/>
-                <a:p>
-                  <a:endParaRPr lang="fr-FR" sz="1000" dirty="0">
-                    <a:solidFill>
-                      <a:srgbClr val="27509B"/>
-                    </a:solidFill>
-                    <a:latin typeface="Gotham Rounded Bold" pitchFamily="50" charset="0"/>
-                  </a:endParaRPr>
-                </a:p>
-              </p:txBody>
-            </p:sp>
-          </p:grpSp>
-          <p:sp>
-            <p:nvSpPr>
-              <p:cNvPr id="40" name="ZoneTexte 39">
-                <a:extLst>
-                  <a:ext uri="{FF2B5EF4-FFF2-40B4-BE49-F238E27FC236}">
-                    <a16:creationId xmlns:a16="http://schemas.microsoft.com/office/drawing/2014/main" id="{4A96F70F-9944-47B3-8736-63CE7BADA6CC}"/>
-                  </a:ext>
-                </a:extLst>
-              </p:cNvPr>
-              <p:cNvSpPr txBox="1"/>
-              <p:nvPr/>
-            </p:nvSpPr>
-            <p:spPr>
-              <a:xfrm>
-                <a:off x="3526972" y="3649357"/>
-                <a:ext cx="2383972" cy="369332"/>
-              </a:xfrm>
-              <a:prstGeom prst="rect">
-                <a:avLst/>
-              </a:prstGeom>
-              <a:solidFill>
-                <a:schemeClr val="bg1"/>
-              </a:solidFill>
-            </p:spPr>
-            <p:txBody>
-              <a:bodyPr wrap="square" rtlCol="0">
-                <a:spAutoFit/>
-              </a:bodyPr>
-              <a:lstStyle/>
-              <a:p>
-                <a:endParaRPr lang="fr-FR" dirty="0">
-                  <a:solidFill>
-                    <a:srgbClr val="85BC25"/>
-                  </a:solidFill>
-                  <a:latin typeface="Michelin Black" panose="02000000000000000000" pitchFamily="50" charset="0"/>
-                </a:endParaRPr>
-              </a:p>
-            </p:txBody>
-          </p:sp>
-        </p:grpSp>
-        <p:sp>
-          <p:nvSpPr>
-            <p:cNvPr id="14" name="Rectangle : coins arrondis 13">
-              <a:extLst>
-                <a:ext uri="{FF2B5EF4-FFF2-40B4-BE49-F238E27FC236}">
-                  <a16:creationId xmlns:a16="http://schemas.microsoft.com/office/drawing/2014/main" id="{3C4DA4BC-8546-5B48-9AD8-064A53AD989E}"/>
-                </a:ext>
-              </a:extLst>
-            </p:cNvPr>
-            <p:cNvSpPr/>
-            <p:nvPr/>
-          </p:nvSpPr>
-          <p:spPr>
-            <a:xfrm>
-              <a:off x="3141617" y="1813913"/>
-              <a:ext cx="385354" cy="216396"/>
-            </a:xfrm>
-            <a:prstGeom prst="roundRect">
-              <a:avLst>
-                <a:gd name="adj" fmla="val 50000"/>
-              </a:avLst>
-            </a:prstGeom>
-            <a:solidFill>
-              <a:schemeClr val="bg1"/>
-            </a:solidFill>
-            <a:ln>
-              <a:noFill/>
-            </a:ln>
-          </p:spPr>
-          <p:txBody>
-            <a:bodyPr wrap="square" lIns="0" tIns="0" rIns="0" bIns="0" rtlCol="0">
-              <a:spAutoFit/>
-            </a:bodyPr>
-            <a:lstStyle/>
-            <a:p>
-              <a:pPr algn="ctr"/>
-              <a:r>
-                <a:rPr lang="fr-FR" sz="1000" b="1" dirty="0">
-                  <a:solidFill>
-                    <a:schemeClr val="tx1">
-                      <a:lumMod val="65000"/>
-                      <a:lumOff val="35000"/>
-                    </a:schemeClr>
-                  </a:solidFill>
-                  <a:latin typeface="Michelin SemiBold" panose="02000000000000000000" pitchFamily="2" charset="0"/>
-                </a:rPr>
-                <a:t>PI</a:t>
-              </a:r>
-            </a:p>
-          </p:txBody>
-        </p:sp>
-        <p:sp>
-          <p:nvSpPr>
-            <p:cNvPr id="19" name="Rectangle : coins arrondis 18">
-              <a:extLst>
-                <a:ext uri="{FF2B5EF4-FFF2-40B4-BE49-F238E27FC236}">
-                  <a16:creationId xmlns:a16="http://schemas.microsoft.com/office/drawing/2014/main" id="{D717D840-683E-2242-85CB-CA80F2C3FF5A}"/>
-                </a:ext>
-              </a:extLst>
-            </p:cNvPr>
-            <p:cNvSpPr/>
-            <p:nvPr/>
-          </p:nvSpPr>
-          <p:spPr>
-            <a:xfrm>
-              <a:off x="5459640" y="1813913"/>
-              <a:ext cx="385354" cy="216396"/>
-            </a:xfrm>
-            <a:prstGeom prst="roundRect">
-              <a:avLst>
-                <a:gd name="adj" fmla="val 50000"/>
-              </a:avLst>
-            </a:prstGeom>
-            <a:solidFill>
-              <a:schemeClr val="bg1"/>
-            </a:solidFill>
-            <a:ln>
-              <a:noFill/>
-            </a:ln>
-          </p:spPr>
-          <p:txBody>
-            <a:bodyPr wrap="square" lIns="0" tIns="0" rIns="0" bIns="0" rtlCol="0">
-              <a:spAutoFit/>
-            </a:bodyPr>
-            <a:lstStyle/>
-            <a:p>
-              <a:pPr algn="ctr"/>
-              <a:r>
-                <a:rPr lang="fr-FR" sz="1000" b="1" dirty="0">
-                  <a:solidFill>
-                    <a:schemeClr val="tx1">
-                      <a:lumMod val="65000"/>
-                      <a:lumOff val="35000"/>
-                    </a:schemeClr>
-                  </a:solidFill>
-                  <a:latin typeface="Michelin SemiBold" panose="02000000000000000000" pitchFamily="2" charset="0"/>
-                </a:rPr>
-                <a:t>PI</a:t>
-              </a:r>
-            </a:p>
-          </p:txBody>
-        </p:sp>
-      </p:grpSp>
-      <p:sp>
-        <p:nvSpPr>
-          <p:cNvPr id="15" name="ZoneTexte 14">
-            <a:extLst>
-              <a:ext uri="{FF2B5EF4-FFF2-40B4-BE49-F238E27FC236}">
-                <a16:creationId xmlns:a16="http://schemas.microsoft.com/office/drawing/2014/main" id="{9FFFC430-B893-224E-822E-C57F5D8DDB62}"/>
-              </a:ext>
-            </a:extLst>
-          </p:cNvPr>
-          <p:cNvSpPr txBox="1"/>
-          <p:nvPr/>
-        </p:nvSpPr>
-        <p:spPr>
-          <a:xfrm>
-            <a:off x="1156310" y="4856125"/>
-            <a:ext cx="1324402" cy="246221"/>
-          </a:xfrm>
-          <a:prstGeom prst="rect">
-            <a:avLst/>
-          </a:prstGeom>
-          <a:noFill/>
-        </p:spPr>
-        <p:txBody>
-          <a:bodyPr wrap="none" rtlCol="0">
-            <a:spAutoFit/>
-          </a:bodyPr>
-          <a:lstStyle/>
-          <a:p>
-            <a:r>
-              <a:rPr lang="en-US" sz="1000" i="1" dirty="0">
-                <a:solidFill>
-                  <a:schemeClr val="tx1">
-                    <a:lumMod val="65000"/>
-                    <a:lumOff val="35000"/>
-                  </a:schemeClr>
-                </a:solidFill>
-              </a:rPr>
-              <a:t>PI: Product Increment</a:t>
-            </a:r>
-          </a:p>
-        </p:txBody>
-      </p:sp>
       <p:sp>
         <p:nvSpPr>
           <p:cNvPr id="22" name="ZoneTexte 21">
@@ -21084,6 +20562,42 @@
           </a:p>
         </p:txBody>
       </p:sp>
+      <p:pic>
+        <p:nvPicPr>
+          <p:cNvPr id="20" name="Graphique 19">
+            <a:extLst>
+              <a:ext uri="{FF2B5EF4-FFF2-40B4-BE49-F238E27FC236}">
+                <a16:creationId xmlns:a16="http://schemas.microsoft.com/office/drawing/2014/main" id="{5FD67F87-B6A8-8548-B84B-C958157FF018}"/>
+              </a:ext>
+            </a:extLst>
+          </p:cNvPr>
+          <p:cNvPicPr>
+            <a:picLocks noChangeAspect="1"/>
+          </p:cNvPicPr>
+          <p:nvPr/>
+        </p:nvPicPr>
+        <p:blipFill>
+          <a:blip r:embed="rId11">
+            <a:extLst>
+              <a:ext uri="{96DAC541-7B7A-43D3-8B79-37D633B846F1}">
+                <asvg:svgBlip xmlns:asvg="http://schemas.microsoft.com/office/drawing/2016/SVG/main" r:embed="rId12"/>
+              </a:ext>
+            </a:extLst>
+          </a:blip>
+          <a:stretch>
+            <a:fillRect/>
+          </a:stretch>
+        </p:blipFill>
+        <p:spPr>
+          <a:xfrm>
+            <a:off x="0" y="1062870"/>
+            <a:ext cx="9144000" cy="2022015"/>
+          </a:xfrm>
+          <a:prstGeom prst="rect">
+            <a:avLst/>
+          </a:prstGeom>
+        </p:spPr>
+      </p:pic>
     </p:spTree>
     <p:extLst>
       <p:ext uri="{BB962C8B-B14F-4D97-AF65-F5344CB8AC3E}">
@@ -24389,6 +23903,15 @@
 </file>
 
 <file path=customXml/item1.xml><?xml version="1.0" encoding="utf-8"?>
+<?mso-contentType ?>
+<FormTemplates xmlns="http://schemas.microsoft.com/sharepoint/v3/contenttype/forms">
+  <Display>DocumentLibraryForm</Display>
+  <Edit>DocumentLibraryForm</Edit>
+  <New>DocumentLibraryForm</New>
+</FormTemplates>
+</file>
+
+<file path=customXml/item2.xml><?xml version="1.0" encoding="utf-8"?>
 <ct:contentTypeSchema xmlns:ct="http://schemas.microsoft.com/office/2006/metadata/contentType" xmlns:ma="http://schemas.microsoft.com/office/2006/metadata/properties/metaAttributes" ct:_="" ma:_="" ma:contentTypeName="Document" ma:contentTypeID="0x010100C8B6676EFF43BD44A973BAF3C3F8897C" ma:contentTypeVersion="11" ma:contentTypeDescription="Crée un document." ma:contentTypeScope="" ma:versionID="16055b838173ea074c74866c85749e9f">
   <xsd:schema xmlns:xsd="http://www.w3.org/2001/XMLSchema" xmlns:xs="http://www.w3.org/2001/XMLSchema" xmlns:p="http://schemas.microsoft.com/office/2006/metadata/properties" xmlns:ns3="e2e26994-5e48-4994-8c16-0b6f61c4bc8a" xmlns:ns4="9f09b4db-7fdb-4a79-a1ce-e7e1d5ac2b17" targetNamespace="http://schemas.microsoft.com/office/2006/metadata/properties" ma:root="true" ma:fieldsID="7356ef530764415288c8753ef1e753cb" ns3:_="" ns4:_="">
     <xsd:import namespace="e2e26994-5e48-4994-8c16-0b6f61c4bc8a"/>
@@ -24597,22 +24120,21 @@
 </ct:contentTypeSchema>
 </file>
 
-<file path=customXml/item2.xml><?xml version="1.0" encoding="utf-8"?>
+<file path=customXml/item3.xml><?xml version="1.0" encoding="utf-8"?>
 <p:properties xmlns:p="http://schemas.microsoft.com/office/2006/metadata/properties" xmlns:xsi="http://www.w3.org/2001/XMLSchema-instance" xmlns:pc="http://schemas.microsoft.com/office/infopath/2007/PartnerControls">
   <documentManagement/>
 </p:properties>
 </file>
 
-<file path=customXml/item3.xml><?xml version="1.0" encoding="utf-8"?>
-<?mso-contentType ?>
-<FormTemplates xmlns="http://schemas.microsoft.com/sharepoint/v3/contenttype/forms">
-  <Display>DocumentLibraryForm</Display>
-  <Edit>DocumentLibraryForm</Edit>
-  <New>DocumentLibraryForm</New>
-</FormTemplates>
+<file path=customXml/itemProps1.xml><?xml version="1.0" encoding="utf-8"?>
+<ds:datastoreItem xmlns:ds="http://schemas.openxmlformats.org/officeDocument/2006/customXml" ds:itemID="{7345BF31-44AE-4465-BECF-E43C8C381DB2}">
+  <ds:schemaRefs>
+    <ds:schemaRef ds:uri="http://schemas.microsoft.com/sharepoint/v3/contenttype/forms"/>
+  </ds:schemaRefs>
+</ds:datastoreItem>
 </file>
 
-<file path=customXml/itemProps1.xml><?xml version="1.0" encoding="utf-8"?>
+<file path=customXml/itemProps2.xml><?xml version="1.0" encoding="utf-8"?>
 <ds:datastoreItem xmlns:ds="http://schemas.openxmlformats.org/officeDocument/2006/customXml" ds:itemID="{FEFC16D8-2F60-4844-97AE-E0BD300158EA}">
   <ds:schemaRefs>
     <ds:schemaRef ds:uri="http://schemas.microsoft.com/office/2006/metadata/contentType"/>
@@ -24631,7 +24153,7 @@
 </ds:datastoreItem>
 </file>
 
-<file path=customXml/itemProps2.xml><?xml version="1.0" encoding="utf-8"?>
+<file path=customXml/itemProps3.xml><?xml version="1.0" encoding="utf-8"?>
 <ds:datastoreItem xmlns:ds="http://schemas.openxmlformats.org/officeDocument/2006/customXml" ds:itemID="{5FC97AAC-D16A-478F-95B1-E9944B8633B3}">
   <ds:schemaRefs>
     <ds:schemaRef ds:uri="http://www.w3.org/XML/1998/namespace"/>
@@ -24646,12 +24168,4 @@
     <ds:schemaRef ds:uri="http://schemas.microsoft.com/office/2006/metadata/properties"/>
   </ds:schemaRefs>
 </ds:datastoreItem>
-</file>
-
-<file path=customXml/itemProps3.xml><?xml version="1.0" encoding="utf-8"?>
-<ds:datastoreItem xmlns:ds="http://schemas.openxmlformats.org/officeDocument/2006/customXml" ds:itemID="{7345BF31-44AE-4465-BECF-E43C8C381DB2}">
-  <ds:schemaRefs>
-    <ds:schemaRef ds:uri="http://schemas.microsoft.com/sharepoint/v3/contenttype/forms"/>
-  </ds:schemaRefs>
-</ds:datastoreItem>
 </file>
</xml_diff>